<commit_message>
added slides and pdf for presentation
</commit_message>
<xml_diff>
--- a/Virtual Whiteboard.pptx
+++ b/Virtual Whiteboard.pptx
@@ -21,13 +21,16 @@
     <p:sldId id="327" r:id="rId15"/>
     <p:sldId id="328" r:id="rId16"/>
     <p:sldId id="329" r:id="rId17"/>
-    <p:sldId id="335" r:id="rId18"/>
-    <p:sldId id="336" r:id="rId19"/>
-    <p:sldId id="337" r:id="rId20"/>
-    <p:sldId id="338" r:id="rId21"/>
-    <p:sldId id="325" r:id="rId22"/>
-    <p:sldId id="324" r:id="rId23"/>
-    <p:sldId id="264" r:id="rId24"/>
+    <p:sldId id="342" r:id="rId18"/>
+    <p:sldId id="343" r:id="rId19"/>
+    <p:sldId id="344" r:id="rId20"/>
+    <p:sldId id="335" r:id="rId21"/>
+    <p:sldId id="336" r:id="rId22"/>
+    <p:sldId id="337" r:id="rId23"/>
+    <p:sldId id="338" r:id="rId24"/>
+    <p:sldId id="325" r:id="rId25"/>
+    <p:sldId id="324" r:id="rId26"/>
+    <p:sldId id="264" r:id="rId27"/>
   </p:sldIdLst>
   <p:sldSz cx="12192000" cy="6858000"/>
   <p:notesSz cx="6858000" cy="9144000"/>
@@ -147,6 +150,9 @@
             <p14:sldId id="327"/>
             <p14:sldId id="328"/>
             <p14:sldId id="329"/>
+            <p14:sldId id="342"/>
+            <p14:sldId id="343"/>
+            <p14:sldId id="344"/>
             <p14:sldId id="335"/>
             <p14:sldId id="336"/>
             <p14:sldId id="337"/>
@@ -3659,12 +3665,12 @@
           <a:p>
             <a:pPr algn="ctr"/>
             <a:r>
-              <a:rPr lang="en-US" sz="4800">
+              <a:rPr lang="en-US" sz="4800" dirty="0">
                 <a:latin typeface="Arial"/>
               </a:rPr>
               <a:t>Extensibility &amp; Potential Improvements</a:t>
             </a:r>
-            <a:endParaRPr/>
+            <a:endParaRPr dirty="0"/>
           </a:p>
         </p:txBody>
       </p:sp>
@@ -5002,11 +5008,19 @@
           <a:p>
             <a:r>
               <a:rPr lang="en-US" dirty="0" err="1" smtClean="0"/>
-              <a:t>SocktIo</a:t>
+              <a:t>SocketIo</a:t>
             </a:r>
             <a:r>
               <a:rPr lang="en-US" dirty="0" smtClean="0"/>
-              <a:t> Rooms?</a:t>
+              <a:t> </a:t>
+            </a:r>
+            <a:r>
+              <a:rPr lang="en-US" dirty="0" smtClean="0"/>
+              <a:t>Rooms</a:t>
+            </a:r>
+            <a:r>
+              <a:rPr lang="en-US" dirty="0" smtClean="0"/>
+              <a:t>?</a:t>
             </a:r>
           </a:p>
           <a:p>
@@ -5058,202 +5072,108 @@
       </p:grpSpPr>
       <p:sp>
         <p:nvSpPr>
-          <p:cNvPr id="168" name="TextShape 1"/>
-          <p:cNvSpPr txBox="1"/>
-          <p:nvPr/>
-        </p:nvSpPr>
-        <p:spPr>
-          <a:xfrm>
-            <a:off x="609480" y="640080"/>
-            <a:ext cx="10972440" cy="1144800"/>
-          </a:xfrm>
-          <a:prstGeom prst="rect">
-            <a:avLst/>
-          </a:prstGeom>
-        </p:spPr>
-        <p:txBody>
-          <a:bodyPr lIns="0" tIns="0" rIns="0" bIns="0" anchor="ctr"/>
-          <a:lstStyle/>
-          <a:p>
-            <a:r>
-              <a:rPr lang="en-US" sz="4400" dirty="0">
-                <a:latin typeface="+mj-lt"/>
-                <a:ea typeface="ＭＳ Ｐゴシック" panose="020B0600070205080204" pitchFamily="34" charset="-128"/>
-                <a:cs typeface="+mj-cs"/>
-              </a:rPr>
-              <a:t>Dev Setup: The problem</a:t>
-            </a:r>
-            <a:r>
-              <a:rPr lang="en-US" sz="4400" dirty="0">
-                <a:latin typeface="+mj-lt"/>
-                <a:ea typeface="ＭＳ Ｐゴシック" panose="020B0600070205080204" pitchFamily="34" charset="-128"/>
-                <a:cs typeface="+mj-cs"/>
-              </a:rPr>
-              <a:t>?</a:t>
-            </a:r>
-            <a:endParaRPr sz="4400" dirty="0">
-              <a:latin typeface="+mj-lt"/>
-              <a:ea typeface="ＭＳ Ｐゴシック" panose="020B0600070205080204" pitchFamily="34" charset="-128"/>
-              <a:cs typeface="+mj-cs"/>
-            </a:endParaRPr>
-          </a:p>
-        </p:txBody>
-      </p:sp>
-      <p:sp>
-        <p:nvSpPr>
-          <p:cNvPr id="169" name="TextShape 2"/>
-          <p:cNvSpPr txBox="1"/>
-          <p:nvPr/>
-        </p:nvSpPr>
-        <p:spPr>
-          <a:xfrm>
-            <a:off x="609480" y="2011680"/>
-            <a:ext cx="10972440" cy="3569760"/>
-          </a:xfrm>
-          <a:prstGeom prst="rect">
-            <a:avLst/>
-          </a:prstGeom>
-        </p:spPr>
-        <p:txBody>
-          <a:bodyPr lIns="0" tIns="0" rIns="0" bIns="0"/>
-          <a:lstStyle/>
-          <a:p>
-            <a:pPr marL="228600" indent="-228600">
-              <a:lnSpc>
-                <a:spcPct val="90000"/>
-              </a:lnSpc>
-              <a:spcBef>
-                <a:spcPts val="1000"/>
-              </a:spcBef>
-              <a:buFont typeface="Arial" panose="020B0604020202020204" pitchFamily="34" charset="0"/>
-              <a:buChar char="•"/>
-            </a:pPr>
-            <a:r>
-              <a:rPr lang="en-US" sz="2800" dirty="0"/>
-              <a:t>Applications can be complex and hard to set up manually</a:t>
-            </a:r>
-          </a:p>
-          <a:p>
-            <a:pPr marL="228600" indent="-228600">
-              <a:lnSpc>
-                <a:spcPct val="90000"/>
-              </a:lnSpc>
-              <a:spcBef>
-                <a:spcPts val="1000"/>
-              </a:spcBef>
-              <a:buFont typeface="Arial" panose="020B0604020202020204" pitchFamily="34" charset="0"/>
-              <a:buChar char="•"/>
-            </a:pPr>
-            <a:r>
-              <a:rPr lang="en-US" sz="2800" dirty="0"/>
-              <a:t>Differences in base OS, software versions, </a:t>
-            </a:r>
-            <a:r>
-              <a:rPr lang="en-US" sz="2800" dirty="0" err="1"/>
-              <a:t>config</a:t>
-            </a:r>
-            <a:r>
-              <a:rPr lang="en-US" sz="2800" dirty="0"/>
-              <a:t> files...</a:t>
-            </a:r>
-          </a:p>
-          <a:p>
-            <a:pPr marL="228600" indent="-228600">
-              <a:lnSpc>
-                <a:spcPct val="90000"/>
-              </a:lnSpc>
-              <a:spcBef>
-                <a:spcPts val="1000"/>
-              </a:spcBef>
-              <a:buFont typeface="Arial" panose="020B0604020202020204" pitchFamily="34" charset="0"/>
-              <a:buChar char="•"/>
-            </a:pPr>
-            <a:r>
-              <a:rPr lang="en-US" sz="2800" dirty="0"/>
-              <a:t>End up with “snowflake setups” (no two are alike)</a:t>
-            </a:r>
-          </a:p>
-          <a:p>
-            <a:pPr marL="228600" indent="-228600">
-              <a:lnSpc>
-                <a:spcPct val="90000"/>
-              </a:lnSpc>
-              <a:spcBef>
-                <a:spcPts val="1000"/>
-              </a:spcBef>
-              <a:buFont typeface="Arial" panose="020B0604020202020204" pitchFamily="34" charset="0"/>
-              <a:buChar char="•"/>
-            </a:pPr>
-            <a:r>
-              <a:rPr lang="en-US" sz="2800" dirty="0"/>
-              <a:t>The dreaded “Works On My Box”</a:t>
-            </a:r>
-            <a:endParaRPr lang="en-US" sz="2800" dirty="0"/>
-          </a:p>
-        </p:txBody>
-      </p:sp>
-      <p:pic>
-        <p:nvPicPr>
-          <p:cNvPr id="170" name="Picture 169"/>
-          <p:cNvPicPr/>
-          <p:nvPr/>
-        </p:nvPicPr>
-        <p:blipFill>
-          <a:blip r:embed="rId2"/>
-          <a:stretch>
-            <a:fillRect/>
-          </a:stretch>
-        </p:blipFill>
-        <p:spPr>
-          <a:xfrm>
-            <a:off x="8371080" y="3433320"/>
-            <a:ext cx="3333240" cy="3333240"/>
-          </a:xfrm>
-          <a:prstGeom prst="rect">
-            <a:avLst/>
-          </a:prstGeom>
-          <a:ln>
-            <a:noFill/>
-          </a:ln>
-        </p:spPr>
-      </p:pic>
+          <p:cNvPr id="2" name="Title 1"/>
+          <p:cNvSpPr>
+            <a:spLocks noGrp="1"/>
+          </p:cNvSpPr>
+          <p:nvPr>
+            <p:ph type="title"/>
+          </p:nvPr>
+        </p:nvSpPr>
+        <p:spPr/>
+        <p:txBody>
+          <a:bodyPr/>
+          <a:lstStyle/>
+          <a:p>
+            <a:r>
+              <a:rPr lang="en-US" dirty="0" smtClean="0"/>
+              <a:t>JAVA API: </a:t>
+            </a:r>
+            <a:r>
+              <a:rPr lang="en-US" dirty="0"/>
+              <a:t>Requirements</a:t>
+            </a:r>
+          </a:p>
+        </p:txBody>
+      </p:sp>
+      <p:sp>
+        <p:nvSpPr>
+          <p:cNvPr id="3" name="Content Placeholder 2"/>
+          <p:cNvSpPr>
+            <a:spLocks noGrp="1"/>
+          </p:cNvSpPr>
+          <p:nvPr>
+            <p:ph idx="1"/>
+          </p:nvPr>
+        </p:nvSpPr>
+        <p:spPr/>
+        <p:txBody>
+          <a:bodyPr/>
+          <a:lstStyle/>
+          <a:p>
+            <a:r>
+              <a:rPr lang="en-US" dirty="0" smtClean="0"/>
+              <a:t>Save </a:t>
+            </a:r>
+            <a:r>
+              <a:rPr lang="en-US" dirty="0"/>
+              <a:t>whiteboard changes and chat messages in </a:t>
+            </a:r>
+            <a:r>
+              <a:rPr lang="en-US" dirty="0" smtClean="0"/>
+              <a:t>real-time</a:t>
+            </a:r>
+          </a:p>
+          <a:p>
+            <a:r>
+              <a:rPr lang="en-US" dirty="0" smtClean="0"/>
+              <a:t>Send </a:t>
+            </a:r>
+            <a:r>
+              <a:rPr lang="en-US" dirty="0"/>
+              <a:t>history of rooms to users upon </a:t>
+            </a:r>
+            <a:r>
+              <a:rPr lang="en-US" dirty="0" smtClean="0"/>
+              <a:t>entry</a:t>
+            </a:r>
+          </a:p>
+          <a:p>
+            <a:r>
+              <a:rPr lang="en-US" dirty="0" smtClean="0"/>
+              <a:t>Use </a:t>
+            </a:r>
+            <a:r>
+              <a:rPr lang="en-US" dirty="0"/>
+              <a:t>flexible data format to support new </a:t>
+            </a:r>
+            <a:r>
+              <a:rPr lang="en-US" dirty="0" smtClean="0"/>
+              <a:t>features</a:t>
+            </a:r>
+          </a:p>
+          <a:p>
+            <a:r>
+              <a:rPr lang="en-US" dirty="0" smtClean="0"/>
+              <a:t>Handle </a:t>
+            </a:r>
+            <a:r>
+              <a:rPr lang="en-US" dirty="0"/>
+              <a:t>write-heavy workload</a:t>
+            </a:r>
+          </a:p>
+        </p:txBody>
+      </p:sp>
     </p:spTree>
     <p:extLst>
       <p:ext uri="{BB962C8B-B14F-4D97-AF65-F5344CB8AC3E}">
-        <p14:creationId xmlns:p14="http://schemas.microsoft.com/office/powerpoint/2010/main" val="288851172"/>
+        <p14:creationId xmlns:p14="http://schemas.microsoft.com/office/powerpoint/2010/main" val="1567867551"/>
       </p:ext>
     </p:extLst>
   </p:cSld>
   <p:clrMapOvr>
     <a:masterClrMapping/>
   </p:clrMapOvr>
-  <p:timing>
-    <p:tnLst>
-      <p:par>
-        <p:cTn id="1" dur="indefinite" restart="never" nodeType="tmRoot">
-          <p:childTnLst>
-            <p:seq>
-              <p:cTn id="2" nodeType="mainSeq"/>
-              <p:prevCondLst>
-                <p:cond evt="onPrev" delay="0">
-                  <p:tgtEl>
-                    <p:sldTgt/>
-                  </p:tgtEl>
-                </p:cond>
-              </p:prevCondLst>
-              <p:nextCondLst>
-                <p:cond evt="onNext" delay="0">
-                  <p:tgtEl>
-                    <p:sldTgt/>
-                  </p:tgtEl>
-                </p:cond>
-              </p:nextCondLst>
-            </p:seq>
-          </p:childTnLst>
-        </p:cTn>
-      </p:par>
-    </p:tnLst>
-  </p:timing>
 </p:sld>
 </file>
 
@@ -5276,319 +5196,113 @@
       </p:grpSpPr>
       <p:sp>
         <p:nvSpPr>
-          <p:cNvPr id="171" name="TextShape 1"/>
-          <p:cNvSpPr txBox="1"/>
-          <p:nvPr/>
-        </p:nvSpPr>
-        <p:spPr>
-          <a:xfrm>
-            <a:off x="609480" y="640080"/>
-            <a:ext cx="10972440" cy="1144800"/>
-          </a:xfrm>
-          <a:prstGeom prst="rect">
-            <a:avLst/>
-          </a:prstGeom>
-        </p:spPr>
-        <p:txBody>
-          <a:bodyPr lIns="0" tIns="0" rIns="0" bIns="0" anchor="ctr"/>
-          <a:lstStyle/>
-          <a:p>
-            <a:r>
-              <a:rPr lang="en-US" sz="4400" dirty="0" smtClean="0">
-                <a:ea typeface="ＭＳ Ｐゴシック" panose="020B0600070205080204" pitchFamily="34" charset="-128"/>
-              </a:rPr>
-              <a:t>Dev </a:t>
-            </a:r>
-            <a:r>
-              <a:rPr lang="en-US" sz="4400" dirty="0">
-                <a:ea typeface="ＭＳ Ｐゴシック" panose="020B0600070205080204" pitchFamily="34" charset="-128"/>
-              </a:rPr>
-              <a:t>Setup: The solution? </a:t>
-            </a:r>
-            <a:endParaRPr sz="4400" dirty="0">
-              <a:ea typeface="ＭＳ Ｐゴシック" panose="020B0600070205080204" pitchFamily="34" charset="-128"/>
-            </a:endParaRPr>
-          </a:p>
-        </p:txBody>
-      </p:sp>
-      <p:sp>
-        <p:nvSpPr>
-          <p:cNvPr id="172" name="TextShape 2"/>
-          <p:cNvSpPr txBox="1"/>
-          <p:nvPr/>
-        </p:nvSpPr>
-        <p:spPr>
-          <a:xfrm>
-            <a:off x="609480" y="1784880"/>
-            <a:ext cx="10972440" cy="4250160"/>
-          </a:xfrm>
-          <a:prstGeom prst="rect">
-            <a:avLst/>
-          </a:prstGeom>
-        </p:spPr>
-        <p:txBody>
-          <a:bodyPr lIns="0" tIns="0" rIns="0" bIns="0"/>
-          <a:lstStyle/>
-          <a:p>
-            <a:pPr>
-              <a:buSzPct val="45000"/>
+          <p:cNvPr id="2" name="Title 1"/>
+          <p:cNvSpPr>
+            <a:spLocks noGrp="1"/>
+          </p:cNvSpPr>
+          <p:nvPr>
+            <p:ph type="title"/>
+          </p:nvPr>
+        </p:nvSpPr>
+        <p:spPr/>
+        <p:txBody>
+          <a:bodyPr/>
+          <a:lstStyle/>
+          <a:p>
+            <a:r>
+              <a:rPr lang="en-US" dirty="0"/>
+              <a:t>Java API: Technologies</a:t>
+            </a:r>
+          </a:p>
+        </p:txBody>
+      </p:sp>
+      <p:sp>
+        <p:nvSpPr>
+          <p:cNvPr id="3" name="Content Placeholder 2"/>
+          <p:cNvSpPr>
+            <a:spLocks noGrp="1"/>
+          </p:cNvSpPr>
+          <p:nvPr>
+            <p:ph idx="1"/>
+          </p:nvPr>
+        </p:nvSpPr>
+        <p:spPr/>
+        <p:txBody>
+          <a:bodyPr/>
+          <a:lstStyle/>
+          <a:p>
+            <a:r>
+              <a:rPr lang="en-US" dirty="0" err="1"/>
+              <a:t>Nginx</a:t>
+            </a:r>
+            <a:r>
+              <a:rPr lang="en-US" dirty="0"/>
+              <a:t> load balancer</a:t>
+            </a:r>
+          </a:p>
+          <a:p>
+            <a:r>
+              <a:rPr lang="en-US" dirty="0" smtClean="0"/>
+              <a:t>MySQL </a:t>
+            </a:r>
+            <a:r>
+              <a:rPr lang="en-US" dirty="0"/>
+              <a:t>database</a:t>
+            </a:r>
+          </a:p>
+          <a:p>
+            <a:r>
+              <a:rPr lang="en-US" dirty="0" smtClean="0"/>
+              <a:t>Tomcat </a:t>
+            </a:r>
+            <a:r>
+              <a:rPr lang="en-US" dirty="0"/>
+              <a:t>app server</a:t>
+            </a:r>
+          </a:p>
+          <a:p>
+            <a:r>
+              <a:rPr lang="en-US" dirty="0" smtClean="0"/>
+              <a:t>Maven</a:t>
+            </a:r>
+            <a:r>
+              <a:rPr lang="en-US" dirty="0"/>
+              <a:t>, Jersey, Jackson, Hibernate, C3P0</a:t>
+            </a:r>
+          </a:p>
+          <a:p>
+            <a:pPr marL="0" indent="0">
+              <a:buNone/>
             </a:pPr>
-            <a:r>
-              <a:rPr lang="en-US" sz="1900" dirty="0"/>
-              <a:t>VAGRANTFILE_API_VERSION = "2"</a:t>
-            </a:r>
-            <a:endParaRPr sz="1900" dirty="0"/>
-          </a:p>
-          <a:p>
-            <a:pPr>
-              <a:buSzPct val="45000"/>
+            <a:endParaRPr lang="en-US" dirty="0" smtClean="0"/>
+          </a:p>
+          <a:p>
+            <a:pPr marL="0" indent="0">
+              <a:buNone/>
             </a:pPr>
             <a:r>
-              <a:rPr lang="en-US" sz="1900" dirty="0" err="1"/>
-              <a:t>Vagrant.configure</a:t>
-            </a:r>
-            <a:r>
-              <a:rPr lang="en-US" sz="1900" dirty="0"/>
-              <a:t>(VAGRANTFILE_API_VERSION) do |</a:t>
-            </a:r>
-            <a:r>
-              <a:rPr lang="en-US" sz="1900" dirty="0" err="1"/>
-              <a:t>config</a:t>
-            </a:r>
-            <a:r>
-              <a:rPr lang="en-US" sz="1900" dirty="0"/>
-              <a:t>|</a:t>
-            </a:r>
-            <a:endParaRPr sz="1900" dirty="0"/>
-          </a:p>
-          <a:p>
-            <a:pPr>
-              <a:buSzPct val="45000"/>
-            </a:pPr>
-            <a:r>
-              <a:rPr lang="en-US" sz="1900" dirty="0"/>
-              <a:t>  </a:t>
-            </a:r>
-            <a:r>
-              <a:rPr lang="en-US" sz="1900" dirty="0" err="1"/>
-              <a:t>config.vm.box</a:t>
-            </a:r>
-            <a:r>
-              <a:rPr lang="en-US" sz="1900" dirty="0"/>
-              <a:t> = "</a:t>
-            </a:r>
-            <a:r>
-              <a:rPr lang="en-US" sz="1900" dirty="0" err="1"/>
-              <a:t>ubuntu</a:t>
-            </a:r>
-            <a:r>
-              <a:rPr lang="en-US" sz="1900" dirty="0"/>
-              <a:t>/trusty64"</a:t>
-            </a:r>
-            <a:endParaRPr sz="1900" dirty="0"/>
-          </a:p>
-          <a:p>
-            <a:pPr>
-              <a:buSzPct val="45000"/>
-              <a:buFont typeface="StarSymbol"/>
-              <a:buChar char=""/>
-            </a:pPr>
-            <a:endParaRPr sz="1900" dirty="0"/>
-          </a:p>
-          <a:p>
-            <a:pPr>
-              <a:buSzPct val="45000"/>
-            </a:pPr>
-            <a:r>
-              <a:rPr lang="en-US" sz="1900" dirty="0"/>
-              <a:t>  </a:t>
-            </a:r>
-            <a:r>
-              <a:rPr lang="en-US" sz="1900" dirty="0" err="1"/>
-              <a:t>dev.vm.provider</a:t>
-            </a:r>
-            <a:r>
-              <a:rPr lang="en-US" sz="1900" dirty="0"/>
-              <a:t> "</a:t>
-            </a:r>
-            <a:r>
-              <a:rPr lang="en-US" sz="1900" dirty="0" err="1"/>
-              <a:t>virtualbox</a:t>
-            </a:r>
-            <a:r>
-              <a:rPr lang="en-US" sz="1900" dirty="0"/>
-              <a:t>" do |</a:t>
-            </a:r>
-            <a:r>
-              <a:rPr lang="en-US" sz="1900" dirty="0" err="1"/>
-              <a:t>vb</a:t>
-            </a:r>
-            <a:r>
-              <a:rPr lang="en-US" sz="1900" dirty="0"/>
-              <a:t>|</a:t>
-            </a:r>
-            <a:endParaRPr sz="1900" dirty="0"/>
-          </a:p>
-          <a:p>
-            <a:pPr>
-              <a:buSzPct val="45000"/>
-            </a:pPr>
-            <a:r>
-              <a:rPr lang="en-US" sz="1900" dirty="0"/>
-              <a:t>    </a:t>
-            </a:r>
-            <a:r>
-              <a:rPr lang="en-US" sz="1900" dirty="0" err="1"/>
-              <a:t>vb.memory</a:t>
-            </a:r>
-            <a:r>
-              <a:rPr lang="en-US" sz="1900" dirty="0"/>
-              <a:t> = 1024</a:t>
-            </a:r>
-            <a:endParaRPr sz="1900" dirty="0"/>
-          </a:p>
-          <a:p>
-            <a:pPr>
-              <a:buSzPct val="45000"/>
-            </a:pPr>
-            <a:r>
-              <a:rPr lang="en-US" sz="1900" dirty="0"/>
-              <a:t>    </a:t>
-            </a:r>
-            <a:r>
-              <a:rPr lang="en-US" sz="1900" dirty="0" err="1"/>
-              <a:t>vb.cpus</a:t>
-            </a:r>
-            <a:r>
-              <a:rPr lang="en-US" sz="1900" dirty="0"/>
-              <a:t> = 2</a:t>
-            </a:r>
-            <a:endParaRPr sz="1900" dirty="0"/>
-          </a:p>
-          <a:p>
-            <a:pPr>
-              <a:buSzPct val="45000"/>
-            </a:pPr>
-            <a:r>
-              <a:rPr lang="en-US" sz="1900" dirty="0"/>
-              <a:t>  end</a:t>
-            </a:r>
-            <a:endParaRPr sz="1900" dirty="0"/>
-          </a:p>
-          <a:p>
-            <a:pPr>
-              <a:buSzPct val="45000"/>
-              <a:buFont typeface="StarSymbol"/>
-              <a:buChar char=""/>
-            </a:pPr>
-            <a:endParaRPr sz="1900" dirty="0"/>
-          </a:p>
-          <a:p>
-            <a:pPr>
-              <a:buSzPct val="45000"/>
-            </a:pPr>
-            <a:r>
-              <a:rPr lang="en-US" sz="1900" dirty="0"/>
-              <a:t>  </a:t>
-            </a:r>
-            <a:r>
-              <a:rPr lang="en-US" sz="1900" dirty="0" err="1"/>
-              <a:t>dev.vm.provision</a:t>
-            </a:r>
-            <a:r>
-              <a:rPr lang="en-US" sz="1900" dirty="0"/>
-              <a:t> "puppet" do |puppet|</a:t>
-            </a:r>
-            <a:endParaRPr sz="1900" dirty="0"/>
-          </a:p>
-          <a:p>
-            <a:pPr>
-              <a:buSzPct val="45000"/>
-            </a:pPr>
-            <a:r>
-              <a:rPr lang="en-US" sz="1900" dirty="0"/>
-              <a:t>    </a:t>
-            </a:r>
-            <a:r>
-              <a:rPr lang="en-US" sz="1900" dirty="0" err="1"/>
-              <a:t>puppet.manifests_path</a:t>
-            </a:r>
-            <a:r>
-              <a:rPr lang="en-US" sz="1900" dirty="0"/>
-              <a:t> = "puppet/manifests"</a:t>
-            </a:r>
-            <a:endParaRPr sz="1900" dirty="0"/>
-          </a:p>
-          <a:p>
-            <a:pPr>
-              <a:buSzPct val="45000"/>
-            </a:pPr>
-            <a:r>
-              <a:rPr lang="en-US" sz="1900" dirty="0"/>
-              <a:t>    </a:t>
-            </a:r>
-            <a:r>
-              <a:rPr lang="en-US" sz="1900" dirty="0" err="1"/>
-              <a:t>puppet.manifest_file</a:t>
-            </a:r>
-            <a:r>
-              <a:rPr lang="en-US" sz="1900" dirty="0"/>
-              <a:t> = "</a:t>
-            </a:r>
-            <a:r>
-              <a:rPr lang="en-US" sz="1900" dirty="0" err="1"/>
-              <a:t>site.pp</a:t>
-            </a:r>
-            <a:r>
-              <a:rPr lang="en-US" sz="1900" dirty="0"/>
-              <a:t>"</a:t>
-            </a:r>
-            <a:endParaRPr sz="1900" dirty="0"/>
-          </a:p>
-          <a:p>
-            <a:pPr>
-              <a:buSzPct val="45000"/>
-            </a:pPr>
-            <a:r>
-              <a:rPr lang="en-US" sz="1900" dirty="0"/>
-              <a:t>    </a:t>
-            </a:r>
-            <a:r>
-              <a:rPr lang="en-US" sz="1900" dirty="0" err="1"/>
-              <a:t>puppet.module_path</a:t>
-            </a:r>
-            <a:r>
-              <a:rPr lang="en-US" sz="1900" dirty="0"/>
-              <a:t> = "puppet/modules"</a:t>
-            </a:r>
-            <a:endParaRPr sz="1900" dirty="0"/>
-          </a:p>
-          <a:p>
-            <a:pPr>
-              <a:buSzPct val="45000"/>
-            </a:pPr>
-            <a:r>
-              <a:rPr lang="en-US" sz="1900" dirty="0"/>
-              <a:t>  end</a:t>
-            </a:r>
-            <a:endParaRPr sz="1900" dirty="0"/>
-          </a:p>
-          <a:p>
-            <a:pPr>
-              <a:buSzPct val="45000"/>
-            </a:pPr>
-            <a:r>
-              <a:rPr lang="en-US" sz="1900" dirty="0"/>
-              <a:t>end</a:t>
-            </a:r>
-            <a:endParaRPr sz="1900" dirty="0"/>
+              <a:rPr lang="en-US" dirty="0" smtClean="0"/>
+              <a:t>Primary </a:t>
+            </a:r>
+            <a:r>
+              <a:rPr lang="en-US" dirty="0"/>
+              <a:t>challenge...</a:t>
+            </a:r>
+          </a:p>
+          <a:p>
+            <a:r>
+              <a:rPr lang="en-US" dirty="0"/>
+              <a:t>connection pooling and performance under load</a:t>
+            </a:r>
           </a:p>
         </p:txBody>
       </p:sp>
       <p:pic>
         <p:nvPicPr>
-          <p:cNvPr id="173" name="Picture 172"/>
-          <p:cNvPicPr/>
+          <p:cNvPr id="5" name="Picture 4"/>
+          <p:cNvPicPr>
+            <a:picLocks noChangeAspect="1"/>
+          </p:cNvPicPr>
           <p:nvPr/>
         </p:nvPicPr>
         <p:blipFill>
@@ -5599,54 +5313,54 @@
         </p:blipFill>
         <p:spPr>
           <a:xfrm>
-            <a:off x="6095700" y="2929680"/>
-            <a:ext cx="4572000" cy="1261800"/>
+            <a:off x="8940218" y="1690688"/>
+            <a:ext cx="2914650" cy="2524125"/>
           </a:xfrm>
           <a:prstGeom prst="rect">
             <a:avLst/>
           </a:prstGeom>
-          <a:ln>
-            <a:noFill/>
-          </a:ln>
+        </p:spPr>
+      </p:pic>
+      <p:pic>
+        <p:nvPicPr>
+          <p:cNvPr id="6" name="Picture 5"/>
+          <p:cNvPicPr>
+            <a:picLocks noChangeAspect="1"/>
+          </p:cNvPicPr>
+          <p:nvPr/>
+        </p:nvPicPr>
+        <p:blipFill>
+          <a:blip r:embed="rId3" cstate="print">
+            <a:extLst>
+              <a:ext uri="{28A0092B-C50C-407E-A947-70E740481C1C}">
+                <a14:useLocalDpi xmlns:a14="http://schemas.microsoft.com/office/drawing/2010/main" val="0"/>
+              </a:ext>
+            </a:extLst>
+          </a:blip>
+          <a:stretch>
+            <a:fillRect/>
+          </a:stretch>
+        </p:blipFill>
+        <p:spPr>
+          <a:xfrm>
+            <a:off x="5820569" y="731136"/>
+            <a:ext cx="2975701" cy="2975701"/>
+          </a:xfrm>
+          <a:prstGeom prst="rect">
+            <a:avLst/>
+          </a:prstGeom>
         </p:spPr>
       </p:pic>
     </p:spTree>
     <p:extLst>
       <p:ext uri="{BB962C8B-B14F-4D97-AF65-F5344CB8AC3E}">
-        <p14:creationId xmlns:p14="http://schemas.microsoft.com/office/powerpoint/2010/main" val="2462142350"/>
+        <p14:creationId xmlns:p14="http://schemas.microsoft.com/office/powerpoint/2010/main" val="225310714"/>
       </p:ext>
     </p:extLst>
   </p:cSld>
   <p:clrMapOvr>
     <a:masterClrMapping/>
   </p:clrMapOvr>
-  <p:timing>
-    <p:tnLst>
-      <p:par>
-        <p:cTn id="1" dur="indefinite" restart="never" nodeType="tmRoot">
-          <p:childTnLst>
-            <p:seq>
-              <p:cTn id="2" nodeType="mainSeq"/>
-              <p:prevCondLst>
-                <p:cond evt="onPrev" delay="0">
-                  <p:tgtEl>
-                    <p:sldTgt/>
-                  </p:tgtEl>
-                </p:cond>
-              </p:prevCondLst>
-              <p:nextCondLst>
-                <p:cond evt="onNext" delay="0">
-                  <p:tgtEl>
-                    <p:sldTgt/>
-                  </p:tgtEl>
-                </p:cond>
-              </p:nextCondLst>
-            </p:seq>
-          </p:childTnLst>
-        </p:cTn>
-      </p:par>
-    </p:tnLst>
-  </p:timing>
 </p:sld>
 </file>
 
@@ -5669,294 +5383,35 @@
       </p:grpSpPr>
       <p:sp>
         <p:nvSpPr>
-          <p:cNvPr id="174" name="TextShape 1"/>
-          <p:cNvSpPr txBox="1"/>
-          <p:nvPr/>
-        </p:nvSpPr>
-        <p:spPr>
-          <a:xfrm>
-            <a:off x="609480" y="640080"/>
-            <a:ext cx="10972440" cy="1144800"/>
-          </a:xfrm>
-          <a:prstGeom prst="rect">
-            <a:avLst/>
-          </a:prstGeom>
-        </p:spPr>
-        <p:txBody>
-          <a:bodyPr lIns="0" tIns="0" rIns="0" bIns="0" anchor="ctr"/>
-          <a:lstStyle/>
-          <a:p>
-            <a:r>
-              <a:rPr lang="en-US" sz="4400" dirty="0" smtClean="0">
-                <a:ea typeface="ＭＳ Ｐゴシック" panose="020B0600070205080204" pitchFamily="34" charset="-128"/>
-              </a:rPr>
-              <a:t>Dev </a:t>
-            </a:r>
-            <a:r>
-              <a:rPr lang="en-US" sz="4400" dirty="0">
-                <a:ea typeface="ＭＳ Ｐゴシック" panose="020B0600070205080204" pitchFamily="34" charset="-128"/>
-              </a:rPr>
-              <a:t>Setup: The solution?</a:t>
-            </a:r>
-            <a:endParaRPr sz="4400" dirty="0">
-              <a:ea typeface="ＭＳ Ｐゴシック" panose="020B0600070205080204" pitchFamily="34" charset="-128"/>
-            </a:endParaRPr>
-          </a:p>
-        </p:txBody>
-      </p:sp>
-      <p:sp>
-        <p:nvSpPr>
-          <p:cNvPr id="175" name="TextShape 2"/>
-          <p:cNvSpPr txBox="1"/>
-          <p:nvPr/>
-        </p:nvSpPr>
-        <p:spPr>
-          <a:xfrm>
-            <a:off x="609480" y="1784880"/>
-            <a:ext cx="10972440" cy="4250160"/>
-          </a:xfrm>
-          <a:prstGeom prst="rect">
-            <a:avLst/>
-          </a:prstGeom>
-        </p:spPr>
-        <p:txBody>
-          <a:bodyPr lIns="0" tIns="0" rIns="0" bIns="0"/>
-          <a:lstStyle/>
-          <a:p>
-            <a:pPr>
-              <a:buSzPct val="45000"/>
-            </a:pPr>
-            <a:r>
-              <a:rPr lang="en-US" sz="2000" dirty="0"/>
-              <a:t>class </a:t>
-            </a:r>
-            <a:r>
-              <a:rPr lang="en-US" sz="2000" dirty="0" err="1"/>
-              <a:t>nginx</a:t>
-            </a:r>
-            <a:r>
-              <a:rPr lang="en-US" sz="2000" dirty="0"/>
-              <a:t> {</a:t>
-            </a:r>
-            <a:endParaRPr sz="2000" dirty="0"/>
-          </a:p>
-          <a:p>
-            <a:pPr>
-              <a:buSzPct val="45000"/>
-            </a:pPr>
-            <a:r>
-              <a:rPr lang="en-US" sz="2000" dirty="0"/>
-              <a:t>  package { '</a:t>
-            </a:r>
-            <a:r>
-              <a:rPr lang="en-US" sz="2000" dirty="0" err="1"/>
-              <a:t>nginx</a:t>
-            </a:r>
-            <a:r>
-              <a:rPr lang="en-US" sz="2000" dirty="0"/>
-              <a:t>': ensure =&gt; present }</a:t>
-            </a:r>
-            <a:endParaRPr sz="2000" dirty="0"/>
-          </a:p>
-          <a:p>
-            <a:pPr>
-              <a:buSzPct val="45000"/>
-              <a:buFont typeface="StarSymbol"/>
-              <a:buChar char=""/>
-            </a:pPr>
-            <a:endParaRPr sz="2000" dirty="0"/>
-          </a:p>
-          <a:p>
-            <a:pPr>
-              <a:buSzPct val="45000"/>
-            </a:pPr>
-            <a:r>
-              <a:rPr lang="en-US" sz="2000" dirty="0"/>
-              <a:t>  service { '</a:t>
-            </a:r>
-            <a:r>
-              <a:rPr lang="en-US" sz="2000" dirty="0" err="1"/>
-              <a:t>nginx</a:t>
-            </a:r>
-            <a:r>
-              <a:rPr lang="en-US" sz="2000" dirty="0"/>
-              <a:t>':</a:t>
-            </a:r>
-            <a:endParaRPr sz="2000" dirty="0"/>
-          </a:p>
-          <a:p>
-            <a:pPr>
-              <a:buSzPct val="45000"/>
-            </a:pPr>
-            <a:r>
-              <a:rPr lang="en-US" sz="2000" dirty="0"/>
-              <a:t>    ensure  =&gt; running,</a:t>
-            </a:r>
-            <a:endParaRPr sz="2000" dirty="0"/>
-          </a:p>
-          <a:p>
-            <a:pPr>
-              <a:buSzPct val="45000"/>
-            </a:pPr>
-            <a:r>
-              <a:rPr lang="en-US" sz="2000" dirty="0"/>
-              <a:t>    </a:t>
-            </a:r>
-            <a:r>
-              <a:rPr lang="en-US" sz="2000" dirty="0"/>
-              <a:t>require =&gt; Package['</a:t>
-            </a:r>
-            <a:r>
-              <a:rPr lang="en-US" sz="2000" dirty="0" err="1"/>
-              <a:t>nginx</a:t>
-            </a:r>
-            <a:r>
-              <a:rPr lang="en-US" sz="2000" dirty="0"/>
-              <a:t>'];</a:t>
-            </a:r>
-            <a:endParaRPr sz="2000" dirty="0"/>
-          </a:p>
-          <a:p>
-            <a:pPr>
-              <a:buSzPct val="45000"/>
-            </a:pPr>
-            <a:r>
-              <a:rPr lang="en-US" sz="2000" dirty="0"/>
-              <a:t>  }</a:t>
-            </a:r>
-            <a:endParaRPr sz="2000" dirty="0"/>
-          </a:p>
-          <a:p>
-            <a:pPr>
-              <a:buSzPct val="45000"/>
-              <a:buFont typeface="StarSymbol"/>
-              <a:buChar char=""/>
-            </a:pPr>
-            <a:endParaRPr sz="2000" dirty="0"/>
-          </a:p>
-          <a:p>
-            <a:pPr>
-              <a:buSzPct val="45000"/>
-            </a:pPr>
-            <a:r>
-              <a:rPr lang="en-US" sz="2000" dirty="0"/>
-              <a:t>  file { '/</a:t>
-            </a:r>
-            <a:r>
-              <a:rPr lang="en-US" sz="2000" dirty="0" err="1"/>
-              <a:t>etc</a:t>
-            </a:r>
-            <a:r>
-              <a:rPr lang="en-US" sz="2000" dirty="0"/>
-              <a:t>/</a:t>
-            </a:r>
-            <a:r>
-              <a:rPr lang="en-US" sz="2000" dirty="0" err="1"/>
-              <a:t>nginx</a:t>
-            </a:r>
-            <a:r>
-              <a:rPr lang="en-US" sz="2000" dirty="0"/>
-              <a:t>/</a:t>
-            </a:r>
-            <a:r>
-              <a:rPr lang="en-US" sz="2000" dirty="0" err="1"/>
-              <a:t>nginx.conf</a:t>
-            </a:r>
-            <a:r>
-              <a:rPr lang="en-US" sz="2000" dirty="0"/>
-              <a:t>':</a:t>
-            </a:r>
-            <a:endParaRPr sz="2000" dirty="0"/>
-          </a:p>
-          <a:p>
-            <a:pPr>
-              <a:buSzPct val="45000"/>
-            </a:pPr>
-            <a:r>
-              <a:rPr lang="en-US" sz="2000" dirty="0"/>
-              <a:t>    source  =&gt; 'puppet:///modules/</a:t>
-            </a:r>
-            <a:r>
-              <a:rPr lang="en-US" sz="2000" dirty="0" err="1"/>
-              <a:t>nginx</a:t>
-            </a:r>
-            <a:r>
-              <a:rPr lang="en-US" sz="2000" dirty="0"/>
-              <a:t>/</a:t>
-            </a:r>
-            <a:r>
-              <a:rPr lang="en-US" sz="2000" dirty="0" err="1"/>
-              <a:t>nginx.conf</a:t>
-            </a:r>
-            <a:r>
-              <a:rPr lang="en-US" sz="2000" dirty="0"/>
-              <a:t>',</a:t>
-            </a:r>
-            <a:endParaRPr sz="2000" dirty="0"/>
-          </a:p>
-          <a:p>
-            <a:pPr>
-              <a:buSzPct val="45000"/>
-            </a:pPr>
-            <a:r>
-              <a:rPr lang="en-US" sz="2000" dirty="0"/>
-              <a:t>    require =&gt; Package['</a:t>
-            </a:r>
-            <a:r>
-              <a:rPr lang="en-US" sz="2000" dirty="0" err="1"/>
-              <a:t>nginx</a:t>
-            </a:r>
-            <a:r>
-              <a:rPr lang="en-US" sz="2000" dirty="0"/>
-              <a:t>'],</a:t>
-            </a:r>
-            <a:endParaRPr sz="2000" dirty="0"/>
-          </a:p>
-          <a:p>
-            <a:pPr>
-              <a:buSzPct val="45000"/>
-            </a:pPr>
-            <a:r>
-              <a:rPr lang="en-US" sz="2000" dirty="0"/>
-              <a:t>    notify  =&gt; Service['</a:t>
-            </a:r>
-            <a:r>
-              <a:rPr lang="en-US" sz="2000" dirty="0" err="1"/>
-              <a:t>nginx</a:t>
-            </a:r>
-            <a:r>
-              <a:rPr lang="en-US" sz="2000" dirty="0"/>
-              <a:t>'];</a:t>
-            </a:r>
-            <a:endParaRPr sz="2000" dirty="0"/>
-          </a:p>
-          <a:p>
-            <a:pPr>
-              <a:buSzPct val="45000"/>
-            </a:pPr>
-            <a:r>
-              <a:rPr lang="en-US" sz="2000" dirty="0"/>
-              <a:t>  }</a:t>
-            </a:r>
-            <a:endParaRPr sz="2000" dirty="0"/>
-          </a:p>
-          <a:p>
-            <a:pPr>
-              <a:buSzPct val="45000"/>
-            </a:pPr>
-            <a:r>
-              <a:rPr lang="en-US" sz="2000" dirty="0"/>
-              <a:t>}</a:t>
-            </a:r>
-            <a:endParaRPr sz="2000" dirty="0"/>
+          <p:cNvPr id="2" name="Title 1"/>
+          <p:cNvSpPr>
+            <a:spLocks noGrp="1"/>
+          </p:cNvSpPr>
+          <p:nvPr>
+            <p:ph type="title"/>
+          </p:nvPr>
+        </p:nvSpPr>
+        <p:spPr/>
+        <p:txBody>
+          <a:bodyPr/>
+          <a:lstStyle/>
+          <a:p>
+            <a:r>
+              <a:rPr lang="en-US" dirty="0"/>
+              <a:t>Java API: Examples</a:t>
+            </a:r>
           </a:p>
         </p:txBody>
       </p:sp>
       <p:pic>
         <p:nvPicPr>
-          <p:cNvPr id="176" name="Picture 175"/>
-          <p:cNvPicPr/>
-          <p:nvPr/>
+          <p:cNvPr id="8" name="Content Placeholder 7"/>
+          <p:cNvPicPr>
+            <a:picLocks noGrp="1" noChangeAspect="1"/>
+          </p:cNvPicPr>
+          <p:nvPr>
+            <p:ph idx="1"/>
+          </p:nvPr>
         </p:nvPicPr>
         <p:blipFill>
           <a:blip r:embed="rId2"/>
@@ -5966,54 +5421,24 @@
         </p:blipFill>
         <p:spPr>
           <a:xfrm>
-            <a:off x="6944289" y="2209355"/>
-            <a:ext cx="3657600" cy="3602880"/>
+            <a:off x="838200" y="1979777"/>
+            <a:ext cx="10515600" cy="4043034"/>
           </a:xfrm>
           <a:prstGeom prst="rect">
             <a:avLst/>
           </a:prstGeom>
-          <a:ln>
-            <a:noFill/>
-          </a:ln>
         </p:spPr>
       </p:pic>
     </p:spTree>
     <p:extLst>
       <p:ext uri="{BB962C8B-B14F-4D97-AF65-F5344CB8AC3E}">
-        <p14:creationId xmlns:p14="http://schemas.microsoft.com/office/powerpoint/2010/main" val="2380265096"/>
+        <p14:creationId xmlns:p14="http://schemas.microsoft.com/office/powerpoint/2010/main" val="1568298807"/>
       </p:ext>
     </p:extLst>
   </p:cSld>
   <p:clrMapOvr>
     <a:masterClrMapping/>
   </p:clrMapOvr>
-  <p:timing>
-    <p:tnLst>
-      <p:par>
-        <p:cTn id="1" dur="indefinite" restart="never" nodeType="tmRoot">
-          <p:childTnLst>
-            <p:seq>
-              <p:cTn id="2" nodeType="mainSeq"/>
-              <p:prevCondLst>
-                <p:cond evt="onPrev" delay="0">
-                  <p:tgtEl>
-                    <p:sldTgt/>
-                  </p:tgtEl>
-                </p:cond>
-              </p:prevCondLst>
-              <p:nextCondLst>
-                <p:cond evt="onNext" delay="0">
-                  <p:tgtEl>
-                    <p:sldTgt/>
-                  </p:tgtEl>
-                </p:cond>
-              </p:nextCondLst>
-            </p:seq>
-          </p:childTnLst>
-        </p:cTn>
-      </p:par>
-    </p:tnLst>
-  </p:timing>
 </p:sld>
 </file>
 
@@ -6118,11 +5543,7 @@
           <a:p>
             <a:r>
               <a:rPr lang="en-US" dirty="0" smtClean="0"/>
-              <a:t>Technologies </a:t>
-            </a:r>
-            <a:r>
-              <a:rPr lang="en-US" dirty="0" smtClean="0"/>
-              <a:t>Used</a:t>
+              <a:t>Technologies Used</a:t>
             </a:r>
           </a:p>
           <a:p>
@@ -6142,7 +5563,6 @@
               <a:rPr lang="en-US" dirty="0" smtClean="0"/>
               <a:t>Future Improvements</a:t>
             </a:r>
-            <a:endParaRPr lang="en-US" dirty="0" smtClean="0"/>
           </a:p>
           <a:p>
             <a:r>
@@ -6245,6 +5665,1343 @@
       </p:grpSpPr>
       <p:sp>
         <p:nvSpPr>
+          <p:cNvPr id="168" name="TextShape 1"/>
+          <p:cNvSpPr txBox="1"/>
+          <p:nvPr/>
+        </p:nvSpPr>
+        <p:spPr>
+          <a:xfrm>
+            <a:off x="609480" y="640080"/>
+            <a:ext cx="10972440" cy="1144800"/>
+          </a:xfrm>
+          <a:prstGeom prst="rect">
+            <a:avLst/>
+          </a:prstGeom>
+        </p:spPr>
+        <p:txBody>
+          <a:bodyPr lIns="0" tIns="0" rIns="0" bIns="0" anchor="ctr"/>
+          <a:lstStyle/>
+          <a:p>
+            <a:r>
+              <a:rPr lang="en-US" sz="4400" dirty="0">
+                <a:latin typeface="+mj-lt"/>
+                <a:ea typeface="ＭＳ Ｐゴシック" panose="020B0600070205080204" pitchFamily="34" charset="-128"/>
+                <a:cs typeface="+mj-cs"/>
+              </a:rPr>
+              <a:t>Dev Setup: The problem?</a:t>
+            </a:r>
+            <a:endParaRPr sz="4400" dirty="0">
+              <a:latin typeface="+mj-lt"/>
+              <a:ea typeface="ＭＳ Ｐゴシック" panose="020B0600070205080204" pitchFamily="34" charset="-128"/>
+              <a:cs typeface="+mj-cs"/>
+            </a:endParaRPr>
+          </a:p>
+        </p:txBody>
+      </p:sp>
+      <p:sp>
+        <p:nvSpPr>
+          <p:cNvPr id="169" name="TextShape 2"/>
+          <p:cNvSpPr txBox="1"/>
+          <p:nvPr/>
+        </p:nvSpPr>
+        <p:spPr>
+          <a:xfrm>
+            <a:off x="609480" y="2011680"/>
+            <a:ext cx="10972440" cy="3569760"/>
+          </a:xfrm>
+          <a:prstGeom prst="rect">
+            <a:avLst/>
+          </a:prstGeom>
+        </p:spPr>
+        <p:txBody>
+          <a:bodyPr lIns="0" tIns="0" rIns="0" bIns="0"/>
+          <a:lstStyle/>
+          <a:p>
+            <a:pPr marL="228600" indent="-228600">
+              <a:lnSpc>
+                <a:spcPct val="90000"/>
+              </a:lnSpc>
+              <a:spcBef>
+                <a:spcPts val="1000"/>
+              </a:spcBef>
+              <a:buFont typeface="Arial" panose="020B0604020202020204" pitchFamily="34" charset="0"/>
+              <a:buChar char="•"/>
+            </a:pPr>
+            <a:r>
+              <a:rPr lang="en-US" sz="2800" dirty="0"/>
+              <a:t>Applications can be complex and hard to set up manually</a:t>
+            </a:r>
+          </a:p>
+          <a:p>
+            <a:pPr marL="228600" indent="-228600">
+              <a:lnSpc>
+                <a:spcPct val="90000"/>
+              </a:lnSpc>
+              <a:spcBef>
+                <a:spcPts val="1000"/>
+              </a:spcBef>
+              <a:buFont typeface="Arial" panose="020B0604020202020204" pitchFamily="34" charset="0"/>
+              <a:buChar char="•"/>
+            </a:pPr>
+            <a:r>
+              <a:rPr lang="en-US" sz="2800" dirty="0"/>
+              <a:t>Differences in base OS, software versions, </a:t>
+            </a:r>
+            <a:r>
+              <a:rPr lang="en-US" sz="2800" dirty="0" err="1"/>
+              <a:t>config</a:t>
+            </a:r>
+            <a:r>
+              <a:rPr lang="en-US" sz="2800" dirty="0"/>
+              <a:t> files...</a:t>
+            </a:r>
+          </a:p>
+          <a:p>
+            <a:pPr marL="228600" indent="-228600">
+              <a:lnSpc>
+                <a:spcPct val="90000"/>
+              </a:lnSpc>
+              <a:spcBef>
+                <a:spcPts val="1000"/>
+              </a:spcBef>
+              <a:buFont typeface="Arial" panose="020B0604020202020204" pitchFamily="34" charset="0"/>
+              <a:buChar char="•"/>
+            </a:pPr>
+            <a:r>
+              <a:rPr lang="en-US" sz="2800" dirty="0"/>
+              <a:t>End up with “snowflake setups” (no two are alike)</a:t>
+            </a:r>
+          </a:p>
+          <a:p>
+            <a:pPr marL="228600" indent="-228600">
+              <a:lnSpc>
+                <a:spcPct val="90000"/>
+              </a:lnSpc>
+              <a:spcBef>
+                <a:spcPts val="1000"/>
+              </a:spcBef>
+              <a:buFont typeface="Arial" panose="020B0604020202020204" pitchFamily="34" charset="0"/>
+              <a:buChar char="•"/>
+            </a:pPr>
+            <a:r>
+              <a:rPr lang="en-US" sz="2800" dirty="0"/>
+              <a:t>The dreaded “Works On My Box”</a:t>
+            </a:r>
+          </a:p>
+        </p:txBody>
+      </p:sp>
+      <p:pic>
+        <p:nvPicPr>
+          <p:cNvPr id="170" name="Picture 169"/>
+          <p:cNvPicPr/>
+          <p:nvPr/>
+        </p:nvPicPr>
+        <p:blipFill>
+          <a:blip r:embed="rId2"/>
+          <a:stretch>
+            <a:fillRect/>
+          </a:stretch>
+        </p:blipFill>
+        <p:spPr>
+          <a:xfrm>
+            <a:off x="8371080" y="3433320"/>
+            <a:ext cx="3333240" cy="3333240"/>
+          </a:xfrm>
+          <a:prstGeom prst="rect">
+            <a:avLst/>
+          </a:prstGeom>
+          <a:ln>
+            <a:noFill/>
+          </a:ln>
+        </p:spPr>
+      </p:pic>
+    </p:spTree>
+    <p:extLst>
+      <p:ext uri="{BB962C8B-B14F-4D97-AF65-F5344CB8AC3E}">
+        <p14:creationId xmlns:p14="http://schemas.microsoft.com/office/powerpoint/2010/main" val="288851172"/>
+      </p:ext>
+    </p:extLst>
+  </p:cSld>
+  <p:clrMapOvr>
+    <a:masterClrMapping/>
+  </p:clrMapOvr>
+  <p:timing>
+    <p:tnLst>
+      <p:par>
+        <p:cTn id="1" dur="indefinite" restart="never" nodeType="tmRoot">
+          <p:childTnLst>
+            <p:seq>
+              <p:cTn id="2" nodeType="mainSeq"/>
+              <p:prevCondLst>
+                <p:cond evt="onPrev" delay="0">
+                  <p:tgtEl>
+                    <p:sldTgt/>
+                  </p:tgtEl>
+                </p:cond>
+              </p:prevCondLst>
+              <p:nextCondLst>
+                <p:cond evt="onNext" delay="0">
+                  <p:tgtEl>
+                    <p:sldTgt/>
+                  </p:tgtEl>
+                </p:cond>
+              </p:nextCondLst>
+            </p:seq>
+          </p:childTnLst>
+        </p:cTn>
+      </p:par>
+    </p:tnLst>
+  </p:timing>
+</p:sld>
+</file>
+
+<file path=ppt/slides/slide21.xml><?xml version="1.0" encoding="utf-8"?>
+<p:sld xmlns:a="http://schemas.openxmlformats.org/drawingml/2006/main" xmlns:r="http://schemas.openxmlformats.org/officeDocument/2006/relationships" xmlns:p="http://schemas.openxmlformats.org/presentationml/2006/main">
+  <p:cSld>
+    <p:spTree>
+      <p:nvGrpSpPr>
+        <p:cNvPr id="1" name=""/>
+        <p:cNvGrpSpPr/>
+        <p:nvPr/>
+      </p:nvGrpSpPr>
+      <p:grpSpPr>
+        <a:xfrm>
+          <a:off x="0" y="0"/>
+          <a:ext cx="0" cy="0"/>
+          <a:chOff x="0" y="0"/>
+          <a:chExt cx="0" cy="0"/>
+        </a:xfrm>
+      </p:grpSpPr>
+      <p:sp>
+        <p:nvSpPr>
+          <p:cNvPr id="171" name="TextShape 1"/>
+          <p:cNvSpPr txBox="1"/>
+          <p:nvPr/>
+        </p:nvSpPr>
+        <p:spPr>
+          <a:xfrm>
+            <a:off x="609480" y="640080"/>
+            <a:ext cx="10972440" cy="1144800"/>
+          </a:xfrm>
+          <a:prstGeom prst="rect">
+            <a:avLst/>
+          </a:prstGeom>
+        </p:spPr>
+        <p:txBody>
+          <a:bodyPr lIns="0" tIns="0" rIns="0" bIns="0" anchor="ctr"/>
+          <a:lstStyle/>
+          <a:p>
+            <a:r>
+              <a:rPr lang="en-US" sz="4400" dirty="0" smtClean="0">
+                <a:ea typeface="ＭＳ Ｐゴシック" panose="020B0600070205080204" pitchFamily="34" charset="-128"/>
+              </a:rPr>
+              <a:t>Dev </a:t>
+            </a:r>
+            <a:r>
+              <a:rPr lang="en-US" sz="4400" dirty="0">
+                <a:ea typeface="ＭＳ Ｐゴシック" panose="020B0600070205080204" pitchFamily="34" charset="-128"/>
+              </a:rPr>
+              <a:t>Setup: The solution? </a:t>
+            </a:r>
+            <a:endParaRPr sz="4400" dirty="0">
+              <a:ea typeface="ＭＳ Ｐゴシック" panose="020B0600070205080204" pitchFamily="34" charset="-128"/>
+            </a:endParaRPr>
+          </a:p>
+        </p:txBody>
+      </p:sp>
+      <p:sp>
+        <p:nvSpPr>
+          <p:cNvPr id="172" name="TextShape 2"/>
+          <p:cNvSpPr txBox="1"/>
+          <p:nvPr/>
+        </p:nvSpPr>
+        <p:spPr>
+          <a:xfrm>
+            <a:off x="609480" y="1784879"/>
+            <a:ext cx="10972440" cy="4358343"/>
+          </a:xfrm>
+          <a:prstGeom prst="rect">
+            <a:avLst/>
+          </a:prstGeom>
+        </p:spPr>
+        <p:txBody>
+          <a:bodyPr lIns="0" tIns="0" rIns="0" bIns="0"/>
+          <a:lstStyle/>
+          <a:p>
+            <a:pPr>
+              <a:buSzPct val="45000"/>
+            </a:pPr>
+            <a:r>
+              <a:rPr lang="en-US" sz="1900" b="1" dirty="0">
+                <a:latin typeface="Courier New" panose="02070309020205020404" pitchFamily="49" charset="0"/>
+                <a:ea typeface="Arial Unicode MS" panose="020B0604020202020204" pitchFamily="34" charset="-128"/>
+                <a:cs typeface="Courier New" panose="02070309020205020404" pitchFamily="49" charset="0"/>
+              </a:rPr>
+              <a:t>VAGRANTFILE_API_VERSION = "2"</a:t>
+            </a:r>
+            <a:endParaRPr sz="1900" b="1" dirty="0">
+              <a:latin typeface="Courier New" panose="02070309020205020404" pitchFamily="49" charset="0"/>
+              <a:ea typeface="Arial Unicode MS" panose="020B0604020202020204" pitchFamily="34" charset="-128"/>
+              <a:cs typeface="Courier New" panose="02070309020205020404" pitchFamily="49" charset="0"/>
+            </a:endParaRPr>
+          </a:p>
+          <a:p>
+            <a:pPr>
+              <a:buSzPct val="45000"/>
+            </a:pPr>
+            <a:r>
+              <a:rPr lang="en-US" sz="1900" b="1" dirty="0" err="1">
+                <a:latin typeface="Courier New" panose="02070309020205020404" pitchFamily="49" charset="0"/>
+                <a:ea typeface="Arial Unicode MS" panose="020B0604020202020204" pitchFamily="34" charset="-128"/>
+                <a:cs typeface="Courier New" panose="02070309020205020404" pitchFamily="49" charset="0"/>
+              </a:rPr>
+              <a:t>Vagrant.configure</a:t>
+            </a:r>
+            <a:r>
+              <a:rPr lang="en-US" sz="1900" b="1" dirty="0">
+                <a:latin typeface="Courier New" panose="02070309020205020404" pitchFamily="49" charset="0"/>
+                <a:ea typeface="Arial Unicode MS" panose="020B0604020202020204" pitchFamily="34" charset="-128"/>
+                <a:cs typeface="Courier New" panose="02070309020205020404" pitchFamily="49" charset="0"/>
+              </a:rPr>
+              <a:t>(VAGRANTFILE_API_VERSION) do |</a:t>
+            </a:r>
+            <a:r>
+              <a:rPr lang="en-US" sz="1900" b="1" dirty="0" err="1">
+                <a:latin typeface="Courier New" panose="02070309020205020404" pitchFamily="49" charset="0"/>
+                <a:ea typeface="Arial Unicode MS" panose="020B0604020202020204" pitchFamily="34" charset="-128"/>
+                <a:cs typeface="Courier New" panose="02070309020205020404" pitchFamily="49" charset="0"/>
+              </a:rPr>
+              <a:t>config</a:t>
+            </a:r>
+            <a:r>
+              <a:rPr lang="en-US" sz="1900" b="1" dirty="0">
+                <a:latin typeface="Courier New" panose="02070309020205020404" pitchFamily="49" charset="0"/>
+                <a:ea typeface="Arial Unicode MS" panose="020B0604020202020204" pitchFamily="34" charset="-128"/>
+                <a:cs typeface="Courier New" panose="02070309020205020404" pitchFamily="49" charset="0"/>
+              </a:rPr>
+              <a:t>|</a:t>
+            </a:r>
+            <a:endParaRPr sz="1900" b="1" dirty="0">
+              <a:latin typeface="Courier New" panose="02070309020205020404" pitchFamily="49" charset="0"/>
+              <a:ea typeface="Arial Unicode MS" panose="020B0604020202020204" pitchFamily="34" charset="-128"/>
+              <a:cs typeface="Courier New" panose="02070309020205020404" pitchFamily="49" charset="0"/>
+            </a:endParaRPr>
+          </a:p>
+          <a:p>
+            <a:pPr>
+              <a:buSzPct val="45000"/>
+            </a:pPr>
+            <a:r>
+              <a:rPr lang="en-US" sz="1900" b="1" dirty="0">
+                <a:latin typeface="Courier New" panose="02070309020205020404" pitchFamily="49" charset="0"/>
+                <a:ea typeface="Arial Unicode MS" panose="020B0604020202020204" pitchFamily="34" charset="-128"/>
+                <a:cs typeface="Courier New" panose="02070309020205020404" pitchFamily="49" charset="0"/>
+              </a:rPr>
+              <a:t>  </a:t>
+            </a:r>
+            <a:r>
+              <a:rPr lang="en-US" sz="1900" b="1" dirty="0" err="1">
+                <a:latin typeface="Courier New" panose="02070309020205020404" pitchFamily="49" charset="0"/>
+                <a:ea typeface="Arial Unicode MS" panose="020B0604020202020204" pitchFamily="34" charset="-128"/>
+                <a:cs typeface="Courier New" panose="02070309020205020404" pitchFamily="49" charset="0"/>
+              </a:rPr>
+              <a:t>config.vm.box</a:t>
+            </a:r>
+            <a:r>
+              <a:rPr lang="en-US" sz="1900" b="1" dirty="0">
+                <a:latin typeface="Courier New" panose="02070309020205020404" pitchFamily="49" charset="0"/>
+                <a:ea typeface="Arial Unicode MS" panose="020B0604020202020204" pitchFamily="34" charset="-128"/>
+                <a:cs typeface="Courier New" panose="02070309020205020404" pitchFamily="49" charset="0"/>
+              </a:rPr>
+              <a:t> = "</a:t>
+            </a:r>
+            <a:r>
+              <a:rPr lang="en-US" sz="1900" b="1" dirty="0" err="1">
+                <a:latin typeface="Courier New" panose="02070309020205020404" pitchFamily="49" charset="0"/>
+                <a:ea typeface="Arial Unicode MS" panose="020B0604020202020204" pitchFamily="34" charset="-128"/>
+                <a:cs typeface="Courier New" panose="02070309020205020404" pitchFamily="49" charset="0"/>
+              </a:rPr>
+              <a:t>ubuntu</a:t>
+            </a:r>
+            <a:r>
+              <a:rPr lang="en-US" sz="1900" b="1" dirty="0">
+                <a:latin typeface="Courier New" panose="02070309020205020404" pitchFamily="49" charset="0"/>
+                <a:ea typeface="Arial Unicode MS" panose="020B0604020202020204" pitchFamily="34" charset="-128"/>
+                <a:cs typeface="Courier New" panose="02070309020205020404" pitchFamily="49" charset="0"/>
+              </a:rPr>
+              <a:t>/trusty64"</a:t>
+            </a:r>
+            <a:endParaRPr sz="1900" b="1" dirty="0">
+              <a:latin typeface="Courier New" panose="02070309020205020404" pitchFamily="49" charset="0"/>
+              <a:ea typeface="Arial Unicode MS" panose="020B0604020202020204" pitchFamily="34" charset="-128"/>
+              <a:cs typeface="Courier New" panose="02070309020205020404" pitchFamily="49" charset="0"/>
+            </a:endParaRPr>
+          </a:p>
+          <a:p>
+            <a:pPr>
+              <a:buSzPct val="45000"/>
+              <a:buFont typeface="StarSymbol"/>
+              <a:buChar char=""/>
+            </a:pPr>
+            <a:endParaRPr sz="1900" b="1" dirty="0">
+              <a:latin typeface="Courier New" panose="02070309020205020404" pitchFamily="49" charset="0"/>
+              <a:ea typeface="Arial Unicode MS" panose="020B0604020202020204" pitchFamily="34" charset="-128"/>
+              <a:cs typeface="Courier New" panose="02070309020205020404" pitchFamily="49" charset="0"/>
+            </a:endParaRPr>
+          </a:p>
+          <a:p>
+            <a:pPr>
+              <a:buSzPct val="45000"/>
+            </a:pPr>
+            <a:r>
+              <a:rPr lang="en-US" sz="1900" b="1" dirty="0">
+                <a:latin typeface="Courier New" panose="02070309020205020404" pitchFamily="49" charset="0"/>
+                <a:ea typeface="Arial Unicode MS" panose="020B0604020202020204" pitchFamily="34" charset="-128"/>
+                <a:cs typeface="Courier New" panose="02070309020205020404" pitchFamily="49" charset="0"/>
+              </a:rPr>
+              <a:t>  </a:t>
+            </a:r>
+            <a:r>
+              <a:rPr lang="en-US" sz="1900" b="1" dirty="0" err="1">
+                <a:latin typeface="Courier New" panose="02070309020205020404" pitchFamily="49" charset="0"/>
+                <a:ea typeface="Arial Unicode MS" panose="020B0604020202020204" pitchFamily="34" charset="-128"/>
+                <a:cs typeface="Courier New" panose="02070309020205020404" pitchFamily="49" charset="0"/>
+              </a:rPr>
+              <a:t>dev.vm.provider</a:t>
+            </a:r>
+            <a:r>
+              <a:rPr lang="en-US" sz="1900" b="1" dirty="0">
+                <a:latin typeface="Courier New" panose="02070309020205020404" pitchFamily="49" charset="0"/>
+                <a:ea typeface="Arial Unicode MS" panose="020B0604020202020204" pitchFamily="34" charset="-128"/>
+                <a:cs typeface="Courier New" panose="02070309020205020404" pitchFamily="49" charset="0"/>
+              </a:rPr>
+              <a:t> "</a:t>
+            </a:r>
+            <a:r>
+              <a:rPr lang="en-US" sz="1900" b="1" dirty="0" err="1">
+                <a:latin typeface="Courier New" panose="02070309020205020404" pitchFamily="49" charset="0"/>
+                <a:ea typeface="Arial Unicode MS" panose="020B0604020202020204" pitchFamily="34" charset="-128"/>
+                <a:cs typeface="Courier New" panose="02070309020205020404" pitchFamily="49" charset="0"/>
+              </a:rPr>
+              <a:t>virtualbox</a:t>
+            </a:r>
+            <a:r>
+              <a:rPr lang="en-US" sz="1900" b="1" dirty="0">
+                <a:latin typeface="Courier New" panose="02070309020205020404" pitchFamily="49" charset="0"/>
+                <a:ea typeface="Arial Unicode MS" panose="020B0604020202020204" pitchFamily="34" charset="-128"/>
+                <a:cs typeface="Courier New" panose="02070309020205020404" pitchFamily="49" charset="0"/>
+              </a:rPr>
+              <a:t>" do |</a:t>
+            </a:r>
+            <a:r>
+              <a:rPr lang="en-US" sz="1900" b="1" dirty="0" err="1">
+                <a:latin typeface="Courier New" panose="02070309020205020404" pitchFamily="49" charset="0"/>
+                <a:ea typeface="Arial Unicode MS" panose="020B0604020202020204" pitchFamily="34" charset="-128"/>
+                <a:cs typeface="Courier New" panose="02070309020205020404" pitchFamily="49" charset="0"/>
+              </a:rPr>
+              <a:t>vb</a:t>
+            </a:r>
+            <a:r>
+              <a:rPr lang="en-US" sz="1900" b="1" dirty="0">
+                <a:latin typeface="Courier New" panose="02070309020205020404" pitchFamily="49" charset="0"/>
+                <a:ea typeface="Arial Unicode MS" panose="020B0604020202020204" pitchFamily="34" charset="-128"/>
+                <a:cs typeface="Courier New" panose="02070309020205020404" pitchFamily="49" charset="0"/>
+              </a:rPr>
+              <a:t>|</a:t>
+            </a:r>
+            <a:endParaRPr sz="1900" b="1" dirty="0">
+              <a:latin typeface="Courier New" panose="02070309020205020404" pitchFamily="49" charset="0"/>
+              <a:ea typeface="Arial Unicode MS" panose="020B0604020202020204" pitchFamily="34" charset="-128"/>
+              <a:cs typeface="Courier New" panose="02070309020205020404" pitchFamily="49" charset="0"/>
+            </a:endParaRPr>
+          </a:p>
+          <a:p>
+            <a:pPr>
+              <a:buSzPct val="45000"/>
+            </a:pPr>
+            <a:r>
+              <a:rPr lang="en-US" sz="1900" b="1" dirty="0">
+                <a:latin typeface="Courier New" panose="02070309020205020404" pitchFamily="49" charset="0"/>
+                <a:ea typeface="Arial Unicode MS" panose="020B0604020202020204" pitchFamily="34" charset="-128"/>
+                <a:cs typeface="Courier New" panose="02070309020205020404" pitchFamily="49" charset="0"/>
+              </a:rPr>
+              <a:t>    </a:t>
+            </a:r>
+            <a:r>
+              <a:rPr lang="en-US" sz="1900" b="1" dirty="0" err="1">
+                <a:latin typeface="Courier New" panose="02070309020205020404" pitchFamily="49" charset="0"/>
+                <a:ea typeface="Arial Unicode MS" panose="020B0604020202020204" pitchFamily="34" charset="-128"/>
+                <a:cs typeface="Courier New" panose="02070309020205020404" pitchFamily="49" charset="0"/>
+              </a:rPr>
+              <a:t>vb.memory</a:t>
+            </a:r>
+            <a:r>
+              <a:rPr lang="en-US" sz="1900" b="1" dirty="0">
+                <a:latin typeface="Courier New" panose="02070309020205020404" pitchFamily="49" charset="0"/>
+                <a:ea typeface="Arial Unicode MS" panose="020B0604020202020204" pitchFamily="34" charset="-128"/>
+                <a:cs typeface="Courier New" panose="02070309020205020404" pitchFamily="49" charset="0"/>
+              </a:rPr>
+              <a:t> = 1024</a:t>
+            </a:r>
+            <a:endParaRPr sz="1900" b="1" dirty="0">
+              <a:latin typeface="Courier New" panose="02070309020205020404" pitchFamily="49" charset="0"/>
+              <a:ea typeface="Arial Unicode MS" panose="020B0604020202020204" pitchFamily="34" charset="-128"/>
+              <a:cs typeface="Courier New" panose="02070309020205020404" pitchFamily="49" charset="0"/>
+            </a:endParaRPr>
+          </a:p>
+          <a:p>
+            <a:pPr>
+              <a:buSzPct val="45000"/>
+            </a:pPr>
+            <a:r>
+              <a:rPr lang="en-US" sz="1900" b="1" dirty="0">
+                <a:latin typeface="Courier New" panose="02070309020205020404" pitchFamily="49" charset="0"/>
+                <a:ea typeface="Arial Unicode MS" panose="020B0604020202020204" pitchFamily="34" charset="-128"/>
+                <a:cs typeface="Courier New" panose="02070309020205020404" pitchFamily="49" charset="0"/>
+              </a:rPr>
+              <a:t>    </a:t>
+            </a:r>
+            <a:r>
+              <a:rPr lang="en-US" sz="1900" b="1" dirty="0" err="1">
+                <a:latin typeface="Courier New" panose="02070309020205020404" pitchFamily="49" charset="0"/>
+                <a:ea typeface="Arial Unicode MS" panose="020B0604020202020204" pitchFamily="34" charset="-128"/>
+                <a:cs typeface="Courier New" panose="02070309020205020404" pitchFamily="49" charset="0"/>
+              </a:rPr>
+              <a:t>vb.cpus</a:t>
+            </a:r>
+            <a:r>
+              <a:rPr lang="en-US" sz="1900" b="1" dirty="0">
+                <a:latin typeface="Courier New" panose="02070309020205020404" pitchFamily="49" charset="0"/>
+                <a:ea typeface="Arial Unicode MS" panose="020B0604020202020204" pitchFamily="34" charset="-128"/>
+                <a:cs typeface="Courier New" panose="02070309020205020404" pitchFamily="49" charset="0"/>
+              </a:rPr>
+              <a:t> = 2</a:t>
+            </a:r>
+            <a:endParaRPr sz="1900" b="1" dirty="0">
+              <a:latin typeface="Courier New" panose="02070309020205020404" pitchFamily="49" charset="0"/>
+              <a:ea typeface="Arial Unicode MS" panose="020B0604020202020204" pitchFamily="34" charset="-128"/>
+              <a:cs typeface="Courier New" panose="02070309020205020404" pitchFamily="49" charset="0"/>
+            </a:endParaRPr>
+          </a:p>
+          <a:p>
+            <a:pPr>
+              <a:buSzPct val="45000"/>
+            </a:pPr>
+            <a:r>
+              <a:rPr lang="en-US" sz="1900" b="1" dirty="0">
+                <a:latin typeface="Courier New" panose="02070309020205020404" pitchFamily="49" charset="0"/>
+                <a:ea typeface="Arial Unicode MS" panose="020B0604020202020204" pitchFamily="34" charset="-128"/>
+                <a:cs typeface="Courier New" panose="02070309020205020404" pitchFamily="49" charset="0"/>
+              </a:rPr>
+              <a:t>  </a:t>
+            </a:r>
+            <a:r>
+              <a:rPr lang="en-US" sz="1900" b="1" dirty="0" smtClean="0">
+                <a:latin typeface="Courier New" panose="02070309020205020404" pitchFamily="49" charset="0"/>
+                <a:ea typeface="Arial Unicode MS" panose="020B0604020202020204" pitchFamily="34" charset="-128"/>
+                <a:cs typeface="Courier New" panose="02070309020205020404" pitchFamily="49" charset="0"/>
+              </a:rPr>
+              <a:t>end</a:t>
+            </a:r>
+            <a:endParaRPr sz="1900" b="1" dirty="0" smtClean="0">
+              <a:latin typeface="Courier New" panose="02070309020205020404" pitchFamily="49" charset="0"/>
+              <a:ea typeface="Arial Unicode MS" panose="020B0604020202020204" pitchFamily="34" charset="-128"/>
+              <a:cs typeface="Courier New" panose="02070309020205020404" pitchFamily="49" charset="0"/>
+            </a:endParaRPr>
+          </a:p>
+          <a:p>
+            <a:pPr>
+              <a:buSzPct val="45000"/>
+              <a:buFont typeface="StarSymbol"/>
+              <a:buChar char=""/>
+            </a:pPr>
+            <a:endParaRPr sz="1900" b="1" dirty="0" smtClean="0">
+              <a:latin typeface="Courier New" panose="02070309020205020404" pitchFamily="49" charset="0"/>
+              <a:ea typeface="Arial Unicode MS" panose="020B0604020202020204" pitchFamily="34" charset="-128"/>
+              <a:cs typeface="Courier New" panose="02070309020205020404" pitchFamily="49" charset="0"/>
+            </a:endParaRPr>
+          </a:p>
+          <a:p>
+            <a:pPr>
+              <a:buSzPct val="45000"/>
+            </a:pPr>
+            <a:r>
+              <a:rPr lang="en-US" sz="1900" b="1" dirty="0" smtClean="0">
+                <a:latin typeface="Courier New" panose="02070309020205020404" pitchFamily="49" charset="0"/>
+                <a:ea typeface="Arial Unicode MS" panose="020B0604020202020204" pitchFamily="34" charset="-128"/>
+                <a:cs typeface="Courier New" panose="02070309020205020404" pitchFamily="49" charset="0"/>
+              </a:rPr>
+              <a:t>  </a:t>
+            </a:r>
+            <a:r>
+              <a:rPr lang="en-US" sz="1900" b="1" dirty="0" err="1">
+                <a:latin typeface="Courier New" panose="02070309020205020404" pitchFamily="49" charset="0"/>
+                <a:ea typeface="Arial Unicode MS" panose="020B0604020202020204" pitchFamily="34" charset="-128"/>
+                <a:cs typeface="Courier New" panose="02070309020205020404" pitchFamily="49" charset="0"/>
+              </a:rPr>
+              <a:t>dev.vm.provision</a:t>
+            </a:r>
+            <a:r>
+              <a:rPr lang="en-US" sz="1900" b="1" dirty="0">
+                <a:latin typeface="Courier New" panose="02070309020205020404" pitchFamily="49" charset="0"/>
+                <a:ea typeface="Arial Unicode MS" panose="020B0604020202020204" pitchFamily="34" charset="-128"/>
+                <a:cs typeface="Courier New" panose="02070309020205020404" pitchFamily="49" charset="0"/>
+              </a:rPr>
+              <a:t> "puppet" do |puppet|</a:t>
+            </a:r>
+            <a:endParaRPr sz="1900" b="1" dirty="0">
+              <a:latin typeface="Courier New" panose="02070309020205020404" pitchFamily="49" charset="0"/>
+              <a:ea typeface="Arial Unicode MS" panose="020B0604020202020204" pitchFamily="34" charset="-128"/>
+              <a:cs typeface="Courier New" panose="02070309020205020404" pitchFamily="49" charset="0"/>
+            </a:endParaRPr>
+          </a:p>
+          <a:p>
+            <a:pPr>
+              <a:buSzPct val="45000"/>
+            </a:pPr>
+            <a:r>
+              <a:rPr lang="en-US" sz="1900" b="1" dirty="0">
+                <a:latin typeface="Courier New" panose="02070309020205020404" pitchFamily="49" charset="0"/>
+                <a:ea typeface="Arial Unicode MS" panose="020B0604020202020204" pitchFamily="34" charset="-128"/>
+                <a:cs typeface="Courier New" panose="02070309020205020404" pitchFamily="49" charset="0"/>
+              </a:rPr>
+              <a:t>    </a:t>
+            </a:r>
+            <a:r>
+              <a:rPr lang="en-US" sz="1900" b="1" dirty="0" err="1">
+                <a:latin typeface="Courier New" panose="02070309020205020404" pitchFamily="49" charset="0"/>
+                <a:ea typeface="Arial Unicode MS" panose="020B0604020202020204" pitchFamily="34" charset="-128"/>
+                <a:cs typeface="Courier New" panose="02070309020205020404" pitchFamily="49" charset="0"/>
+              </a:rPr>
+              <a:t>puppet.manifests_path</a:t>
+            </a:r>
+            <a:r>
+              <a:rPr lang="en-US" sz="1900" b="1" dirty="0">
+                <a:latin typeface="Courier New" panose="02070309020205020404" pitchFamily="49" charset="0"/>
+                <a:ea typeface="Arial Unicode MS" panose="020B0604020202020204" pitchFamily="34" charset="-128"/>
+                <a:cs typeface="Courier New" panose="02070309020205020404" pitchFamily="49" charset="0"/>
+              </a:rPr>
+              <a:t> = "puppet/manifests"</a:t>
+            </a:r>
+            <a:endParaRPr sz="1900" b="1" dirty="0">
+              <a:latin typeface="Courier New" panose="02070309020205020404" pitchFamily="49" charset="0"/>
+              <a:ea typeface="Arial Unicode MS" panose="020B0604020202020204" pitchFamily="34" charset="-128"/>
+              <a:cs typeface="Courier New" panose="02070309020205020404" pitchFamily="49" charset="0"/>
+            </a:endParaRPr>
+          </a:p>
+          <a:p>
+            <a:pPr>
+              <a:buSzPct val="45000"/>
+            </a:pPr>
+            <a:r>
+              <a:rPr lang="en-US" sz="1900" b="1" dirty="0">
+                <a:latin typeface="Courier New" panose="02070309020205020404" pitchFamily="49" charset="0"/>
+                <a:ea typeface="Arial Unicode MS" panose="020B0604020202020204" pitchFamily="34" charset="-128"/>
+                <a:cs typeface="Courier New" panose="02070309020205020404" pitchFamily="49" charset="0"/>
+              </a:rPr>
+              <a:t>    </a:t>
+            </a:r>
+            <a:r>
+              <a:rPr lang="en-US" sz="1900" b="1" dirty="0" err="1">
+                <a:latin typeface="Courier New" panose="02070309020205020404" pitchFamily="49" charset="0"/>
+                <a:ea typeface="Arial Unicode MS" panose="020B0604020202020204" pitchFamily="34" charset="-128"/>
+                <a:cs typeface="Courier New" panose="02070309020205020404" pitchFamily="49" charset="0"/>
+              </a:rPr>
+              <a:t>puppet.manifest_file</a:t>
+            </a:r>
+            <a:r>
+              <a:rPr lang="en-US" sz="1900" b="1" dirty="0">
+                <a:latin typeface="Courier New" panose="02070309020205020404" pitchFamily="49" charset="0"/>
+                <a:ea typeface="Arial Unicode MS" panose="020B0604020202020204" pitchFamily="34" charset="-128"/>
+                <a:cs typeface="Courier New" panose="02070309020205020404" pitchFamily="49" charset="0"/>
+              </a:rPr>
+              <a:t> = "</a:t>
+            </a:r>
+            <a:r>
+              <a:rPr lang="en-US" sz="1900" b="1" dirty="0" err="1">
+                <a:latin typeface="Courier New" panose="02070309020205020404" pitchFamily="49" charset="0"/>
+                <a:ea typeface="Arial Unicode MS" panose="020B0604020202020204" pitchFamily="34" charset="-128"/>
+                <a:cs typeface="Courier New" panose="02070309020205020404" pitchFamily="49" charset="0"/>
+              </a:rPr>
+              <a:t>site.pp</a:t>
+            </a:r>
+            <a:r>
+              <a:rPr lang="en-US" sz="1900" b="1" dirty="0">
+                <a:latin typeface="Courier New" panose="02070309020205020404" pitchFamily="49" charset="0"/>
+                <a:ea typeface="Arial Unicode MS" panose="020B0604020202020204" pitchFamily="34" charset="-128"/>
+                <a:cs typeface="Courier New" panose="02070309020205020404" pitchFamily="49" charset="0"/>
+              </a:rPr>
+              <a:t>"</a:t>
+            </a:r>
+            <a:endParaRPr sz="1900" b="1" dirty="0">
+              <a:latin typeface="Courier New" panose="02070309020205020404" pitchFamily="49" charset="0"/>
+              <a:ea typeface="Arial Unicode MS" panose="020B0604020202020204" pitchFamily="34" charset="-128"/>
+              <a:cs typeface="Courier New" panose="02070309020205020404" pitchFamily="49" charset="0"/>
+            </a:endParaRPr>
+          </a:p>
+          <a:p>
+            <a:pPr>
+              <a:buSzPct val="45000"/>
+            </a:pPr>
+            <a:r>
+              <a:rPr lang="en-US" sz="1900" b="1" dirty="0">
+                <a:latin typeface="Courier New" panose="02070309020205020404" pitchFamily="49" charset="0"/>
+                <a:ea typeface="Arial Unicode MS" panose="020B0604020202020204" pitchFamily="34" charset="-128"/>
+                <a:cs typeface="Courier New" panose="02070309020205020404" pitchFamily="49" charset="0"/>
+              </a:rPr>
+              <a:t>    </a:t>
+            </a:r>
+            <a:r>
+              <a:rPr lang="en-US" sz="1900" b="1" dirty="0" err="1">
+                <a:latin typeface="Courier New" panose="02070309020205020404" pitchFamily="49" charset="0"/>
+                <a:ea typeface="Arial Unicode MS" panose="020B0604020202020204" pitchFamily="34" charset="-128"/>
+                <a:cs typeface="Courier New" panose="02070309020205020404" pitchFamily="49" charset="0"/>
+              </a:rPr>
+              <a:t>puppet.module_path</a:t>
+            </a:r>
+            <a:r>
+              <a:rPr lang="en-US" sz="1900" b="1" dirty="0">
+                <a:latin typeface="Courier New" panose="02070309020205020404" pitchFamily="49" charset="0"/>
+                <a:ea typeface="Arial Unicode MS" panose="020B0604020202020204" pitchFamily="34" charset="-128"/>
+                <a:cs typeface="Courier New" panose="02070309020205020404" pitchFamily="49" charset="0"/>
+              </a:rPr>
+              <a:t> = "puppet/modules"</a:t>
+            </a:r>
+            <a:endParaRPr sz="1900" b="1" dirty="0">
+              <a:latin typeface="Courier New" panose="02070309020205020404" pitchFamily="49" charset="0"/>
+              <a:ea typeface="Arial Unicode MS" panose="020B0604020202020204" pitchFamily="34" charset="-128"/>
+              <a:cs typeface="Courier New" panose="02070309020205020404" pitchFamily="49" charset="0"/>
+            </a:endParaRPr>
+          </a:p>
+          <a:p>
+            <a:pPr>
+              <a:buSzPct val="45000"/>
+            </a:pPr>
+            <a:r>
+              <a:rPr lang="en-US" sz="1900" b="1" dirty="0">
+                <a:latin typeface="Courier New" panose="02070309020205020404" pitchFamily="49" charset="0"/>
+                <a:ea typeface="Arial Unicode MS" panose="020B0604020202020204" pitchFamily="34" charset="-128"/>
+                <a:cs typeface="Courier New" panose="02070309020205020404" pitchFamily="49" charset="0"/>
+              </a:rPr>
+              <a:t>  end</a:t>
+            </a:r>
+            <a:endParaRPr sz="1900" b="1" dirty="0">
+              <a:latin typeface="Courier New" panose="02070309020205020404" pitchFamily="49" charset="0"/>
+              <a:ea typeface="Arial Unicode MS" panose="020B0604020202020204" pitchFamily="34" charset="-128"/>
+              <a:cs typeface="Courier New" panose="02070309020205020404" pitchFamily="49" charset="0"/>
+            </a:endParaRPr>
+          </a:p>
+          <a:p>
+            <a:pPr>
+              <a:buSzPct val="45000"/>
+            </a:pPr>
+            <a:r>
+              <a:rPr lang="en-US" sz="1900" b="1" dirty="0">
+                <a:latin typeface="Courier New" panose="02070309020205020404" pitchFamily="49" charset="0"/>
+                <a:ea typeface="Arial Unicode MS" panose="020B0604020202020204" pitchFamily="34" charset="-128"/>
+                <a:cs typeface="Courier New" panose="02070309020205020404" pitchFamily="49" charset="0"/>
+              </a:rPr>
+              <a:t>end</a:t>
+            </a:r>
+            <a:endParaRPr sz="1900" b="1" dirty="0">
+              <a:latin typeface="Courier New" panose="02070309020205020404" pitchFamily="49" charset="0"/>
+              <a:ea typeface="Arial Unicode MS" panose="020B0604020202020204" pitchFamily="34" charset="-128"/>
+              <a:cs typeface="Courier New" panose="02070309020205020404" pitchFamily="49" charset="0"/>
+            </a:endParaRPr>
+          </a:p>
+        </p:txBody>
+      </p:sp>
+      <p:pic>
+        <p:nvPicPr>
+          <p:cNvPr id="173" name="Picture 172"/>
+          <p:cNvPicPr/>
+          <p:nvPr/>
+        </p:nvPicPr>
+        <p:blipFill>
+          <a:blip r:embed="rId2"/>
+          <a:stretch>
+            <a:fillRect/>
+          </a:stretch>
+        </p:blipFill>
+        <p:spPr>
+          <a:xfrm>
+            <a:off x="7009920" y="2994074"/>
+            <a:ext cx="4572000" cy="1261800"/>
+          </a:xfrm>
+          <a:prstGeom prst="rect">
+            <a:avLst/>
+          </a:prstGeom>
+          <a:ln>
+            <a:noFill/>
+          </a:ln>
+        </p:spPr>
+      </p:pic>
+    </p:spTree>
+    <p:extLst>
+      <p:ext uri="{BB962C8B-B14F-4D97-AF65-F5344CB8AC3E}">
+        <p14:creationId xmlns:p14="http://schemas.microsoft.com/office/powerpoint/2010/main" val="2462142350"/>
+      </p:ext>
+    </p:extLst>
+  </p:cSld>
+  <p:clrMapOvr>
+    <a:masterClrMapping/>
+  </p:clrMapOvr>
+  <p:timing>
+    <p:tnLst>
+      <p:par>
+        <p:cTn id="1" dur="indefinite" restart="never" nodeType="tmRoot">
+          <p:childTnLst>
+            <p:seq>
+              <p:cTn id="2" nodeType="mainSeq"/>
+              <p:prevCondLst>
+                <p:cond evt="onPrev" delay="0">
+                  <p:tgtEl>
+                    <p:sldTgt/>
+                  </p:tgtEl>
+                </p:cond>
+              </p:prevCondLst>
+              <p:nextCondLst>
+                <p:cond evt="onNext" delay="0">
+                  <p:tgtEl>
+                    <p:sldTgt/>
+                  </p:tgtEl>
+                </p:cond>
+              </p:nextCondLst>
+            </p:seq>
+          </p:childTnLst>
+        </p:cTn>
+      </p:par>
+    </p:tnLst>
+  </p:timing>
+</p:sld>
+</file>
+
+<file path=ppt/slides/slide22.xml><?xml version="1.0" encoding="utf-8"?>
+<p:sld xmlns:a="http://schemas.openxmlformats.org/drawingml/2006/main" xmlns:r="http://schemas.openxmlformats.org/officeDocument/2006/relationships" xmlns:p="http://schemas.openxmlformats.org/presentationml/2006/main">
+  <p:cSld>
+    <p:spTree>
+      <p:nvGrpSpPr>
+        <p:cNvPr id="1" name=""/>
+        <p:cNvGrpSpPr/>
+        <p:nvPr/>
+      </p:nvGrpSpPr>
+      <p:grpSpPr>
+        <a:xfrm>
+          <a:off x="0" y="0"/>
+          <a:ext cx="0" cy="0"/>
+          <a:chOff x="0" y="0"/>
+          <a:chExt cx="0" cy="0"/>
+        </a:xfrm>
+      </p:grpSpPr>
+      <p:sp>
+        <p:nvSpPr>
+          <p:cNvPr id="174" name="TextShape 1"/>
+          <p:cNvSpPr txBox="1"/>
+          <p:nvPr/>
+        </p:nvSpPr>
+        <p:spPr>
+          <a:xfrm>
+            <a:off x="609480" y="640080"/>
+            <a:ext cx="10972440" cy="1144800"/>
+          </a:xfrm>
+          <a:prstGeom prst="rect">
+            <a:avLst/>
+          </a:prstGeom>
+        </p:spPr>
+        <p:txBody>
+          <a:bodyPr lIns="0" tIns="0" rIns="0" bIns="0" anchor="ctr"/>
+          <a:lstStyle/>
+          <a:p>
+            <a:r>
+              <a:rPr lang="en-US" sz="4400" dirty="0" smtClean="0">
+                <a:ea typeface="ＭＳ Ｐゴシック" panose="020B0600070205080204" pitchFamily="34" charset="-128"/>
+              </a:rPr>
+              <a:t>Dev </a:t>
+            </a:r>
+            <a:r>
+              <a:rPr lang="en-US" sz="4400" dirty="0">
+                <a:ea typeface="ＭＳ Ｐゴシック" panose="020B0600070205080204" pitchFamily="34" charset="-128"/>
+              </a:rPr>
+              <a:t>Setup: The solution?</a:t>
+            </a:r>
+            <a:endParaRPr sz="4400" dirty="0">
+              <a:ea typeface="ＭＳ Ｐゴシック" panose="020B0600070205080204" pitchFamily="34" charset="-128"/>
+            </a:endParaRPr>
+          </a:p>
+        </p:txBody>
+      </p:sp>
+      <p:sp>
+        <p:nvSpPr>
+          <p:cNvPr id="175" name="TextShape 2"/>
+          <p:cNvSpPr txBox="1"/>
+          <p:nvPr/>
+        </p:nvSpPr>
+        <p:spPr>
+          <a:xfrm>
+            <a:off x="609480" y="1784880"/>
+            <a:ext cx="10972440" cy="4250160"/>
+          </a:xfrm>
+          <a:prstGeom prst="rect">
+            <a:avLst/>
+          </a:prstGeom>
+        </p:spPr>
+        <p:txBody>
+          <a:bodyPr lIns="0" tIns="0" rIns="0" bIns="0"/>
+          <a:lstStyle/>
+          <a:p>
+            <a:pPr>
+              <a:buSzPct val="45000"/>
+            </a:pPr>
+            <a:r>
+              <a:rPr lang="en-US" sz="2000" b="1" dirty="0">
+                <a:latin typeface="Courier New" panose="02070309020205020404" pitchFamily="49" charset="0"/>
+                <a:cs typeface="Courier New" panose="02070309020205020404" pitchFamily="49" charset="0"/>
+              </a:rPr>
+              <a:t>class </a:t>
+            </a:r>
+            <a:r>
+              <a:rPr lang="en-US" sz="2000" b="1" dirty="0" err="1">
+                <a:latin typeface="Courier New" panose="02070309020205020404" pitchFamily="49" charset="0"/>
+                <a:cs typeface="Courier New" panose="02070309020205020404" pitchFamily="49" charset="0"/>
+              </a:rPr>
+              <a:t>nginx</a:t>
+            </a:r>
+            <a:r>
+              <a:rPr lang="en-US" sz="2000" b="1" dirty="0">
+                <a:latin typeface="Courier New" panose="02070309020205020404" pitchFamily="49" charset="0"/>
+                <a:cs typeface="Courier New" panose="02070309020205020404" pitchFamily="49" charset="0"/>
+              </a:rPr>
+              <a:t> {</a:t>
+            </a:r>
+            <a:endParaRPr sz="2000" b="1" dirty="0">
+              <a:latin typeface="Courier New" panose="02070309020205020404" pitchFamily="49" charset="0"/>
+              <a:cs typeface="Courier New" panose="02070309020205020404" pitchFamily="49" charset="0"/>
+            </a:endParaRPr>
+          </a:p>
+          <a:p>
+            <a:pPr>
+              <a:buSzPct val="45000"/>
+            </a:pPr>
+            <a:r>
+              <a:rPr lang="en-US" sz="2000" b="1" dirty="0">
+                <a:latin typeface="Courier New" panose="02070309020205020404" pitchFamily="49" charset="0"/>
+                <a:cs typeface="Courier New" panose="02070309020205020404" pitchFamily="49" charset="0"/>
+              </a:rPr>
+              <a:t>  package { '</a:t>
+            </a:r>
+            <a:r>
+              <a:rPr lang="en-US" sz="2000" b="1" dirty="0" err="1">
+                <a:latin typeface="Courier New" panose="02070309020205020404" pitchFamily="49" charset="0"/>
+                <a:cs typeface="Courier New" panose="02070309020205020404" pitchFamily="49" charset="0"/>
+              </a:rPr>
+              <a:t>nginx</a:t>
+            </a:r>
+            <a:r>
+              <a:rPr lang="en-US" sz="2000" b="1" dirty="0">
+                <a:latin typeface="Courier New" panose="02070309020205020404" pitchFamily="49" charset="0"/>
+                <a:cs typeface="Courier New" panose="02070309020205020404" pitchFamily="49" charset="0"/>
+              </a:rPr>
+              <a:t>': ensure =&gt; present }</a:t>
+            </a:r>
+            <a:endParaRPr sz="2000" b="1" dirty="0">
+              <a:latin typeface="Courier New" panose="02070309020205020404" pitchFamily="49" charset="0"/>
+              <a:cs typeface="Courier New" panose="02070309020205020404" pitchFamily="49" charset="0"/>
+            </a:endParaRPr>
+          </a:p>
+          <a:p>
+            <a:pPr>
+              <a:buSzPct val="45000"/>
+              <a:buFont typeface="StarSymbol"/>
+              <a:buChar char=""/>
+            </a:pPr>
+            <a:endParaRPr sz="2000" b="1" dirty="0">
+              <a:latin typeface="Courier New" panose="02070309020205020404" pitchFamily="49" charset="0"/>
+              <a:cs typeface="Courier New" panose="02070309020205020404" pitchFamily="49" charset="0"/>
+            </a:endParaRPr>
+          </a:p>
+          <a:p>
+            <a:pPr>
+              <a:buSzPct val="45000"/>
+            </a:pPr>
+            <a:r>
+              <a:rPr lang="en-US" sz="2000" b="1" dirty="0">
+                <a:latin typeface="Courier New" panose="02070309020205020404" pitchFamily="49" charset="0"/>
+                <a:cs typeface="Courier New" panose="02070309020205020404" pitchFamily="49" charset="0"/>
+              </a:rPr>
+              <a:t>  service { '</a:t>
+            </a:r>
+            <a:r>
+              <a:rPr lang="en-US" sz="2000" b="1" dirty="0" err="1">
+                <a:latin typeface="Courier New" panose="02070309020205020404" pitchFamily="49" charset="0"/>
+                <a:cs typeface="Courier New" panose="02070309020205020404" pitchFamily="49" charset="0"/>
+              </a:rPr>
+              <a:t>nginx</a:t>
+            </a:r>
+            <a:r>
+              <a:rPr lang="en-US" sz="2000" b="1" dirty="0">
+                <a:latin typeface="Courier New" panose="02070309020205020404" pitchFamily="49" charset="0"/>
+                <a:cs typeface="Courier New" panose="02070309020205020404" pitchFamily="49" charset="0"/>
+              </a:rPr>
+              <a:t>':</a:t>
+            </a:r>
+            <a:endParaRPr sz="2000" b="1" dirty="0">
+              <a:latin typeface="Courier New" panose="02070309020205020404" pitchFamily="49" charset="0"/>
+              <a:cs typeface="Courier New" panose="02070309020205020404" pitchFamily="49" charset="0"/>
+            </a:endParaRPr>
+          </a:p>
+          <a:p>
+            <a:pPr>
+              <a:buSzPct val="45000"/>
+            </a:pPr>
+            <a:r>
+              <a:rPr lang="en-US" sz="2000" b="1" dirty="0">
+                <a:latin typeface="Courier New" panose="02070309020205020404" pitchFamily="49" charset="0"/>
+                <a:cs typeface="Courier New" panose="02070309020205020404" pitchFamily="49" charset="0"/>
+              </a:rPr>
+              <a:t>    ensure  =&gt; running,</a:t>
+            </a:r>
+            <a:endParaRPr sz="2000" b="1" dirty="0">
+              <a:latin typeface="Courier New" panose="02070309020205020404" pitchFamily="49" charset="0"/>
+              <a:cs typeface="Courier New" panose="02070309020205020404" pitchFamily="49" charset="0"/>
+            </a:endParaRPr>
+          </a:p>
+          <a:p>
+            <a:pPr>
+              <a:buSzPct val="45000"/>
+            </a:pPr>
+            <a:r>
+              <a:rPr lang="en-US" sz="2000" b="1" dirty="0">
+                <a:latin typeface="Courier New" panose="02070309020205020404" pitchFamily="49" charset="0"/>
+                <a:cs typeface="Courier New" panose="02070309020205020404" pitchFamily="49" charset="0"/>
+              </a:rPr>
+              <a:t>    require =&gt; Package['</a:t>
+            </a:r>
+            <a:r>
+              <a:rPr lang="en-US" sz="2000" b="1" dirty="0" err="1">
+                <a:latin typeface="Courier New" panose="02070309020205020404" pitchFamily="49" charset="0"/>
+                <a:cs typeface="Courier New" panose="02070309020205020404" pitchFamily="49" charset="0"/>
+              </a:rPr>
+              <a:t>nginx</a:t>
+            </a:r>
+            <a:r>
+              <a:rPr lang="en-US" sz="2000" b="1" dirty="0">
+                <a:latin typeface="Courier New" panose="02070309020205020404" pitchFamily="49" charset="0"/>
+                <a:cs typeface="Courier New" panose="02070309020205020404" pitchFamily="49" charset="0"/>
+              </a:rPr>
+              <a:t>'];</a:t>
+            </a:r>
+            <a:endParaRPr sz="2000" b="1" dirty="0">
+              <a:latin typeface="Courier New" panose="02070309020205020404" pitchFamily="49" charset="0"/>
+              <a:cs typeface="Courier New" panose="02070309020205020404" pitchFamily="49" charset="0"/>
+            </a:endParaRPr>
+          </a:p>
+          <a:p>
+            <a:pPr>
+              <a:buSzPct val="45000"/>
+            </a:pPr>
+            <a:r>
+              <a:rPr lang="en-US" sz="2000" b="1" dirty="0">
+                <a:latin typeface="Courier New" panose="02070309020205020404" pitchFamily="49" charset="0"/>
+                <a:cs typeface="Courier New" panose="02070309020205020404" pitchFamily="49" charset="0"/>
+              </a:rPr>
+              <a:t>  }</a:t>
+            </a:r>
+            <a:endParaRPr sz="2000" b="1" dirty="0">
+              <a:latin typeface="Courier New" panose="02070309020205020404" pitchFamily="49" charset="0"/>
+              <a:cs typeface="Courier New" panose="02070309020205020404" pitchFamily="49" charset="0"/>
+            </a:endParaRPr>
+          </a:p>
+          <a:p>
+            <a:pPr>
+              <a:buSzPct val="45000"/>
+              <a:buFont typeface="StarSymbol"/>
+              <a:buChar char=""/>
+            </a:pPr>
+            <a:endParaRPr sz="2000" b="1" dirty="0">
+              <a:latin typeface="Courier New" panose="02070309020205020404" pitchFamily="49" charset="0"/>
+              <a:cs typeface="Courier New" panose="02070309020205020404" pitchFamily="49" charset="0"/>
+            </a:endParaRPr>
+          </a:p>
+          <a:p>
+            <a:pPr>
+              <a:buSzPct val="45000"/>
+            </a:pPr>
+            <a:r>
+              <a:rPr lang="en-US" sz="2000" b="1" dirty="0">
+                <a:latin typeface="Courier New" panose="02070309020205020404" pitchFamily="49" charset="0"/>
+                <a:cs typeface="Courier New" panose="02070309020205020404" pitchFamily="49" charset="0"/>
+              </a:rPr>
+              <a:t>  file { '/</a:t>
+            </a:r>
+            <a:r>
+              <a:rPr lang="en-US" sz="2000" b="1" dirty="0" err="1">
+                <a:latin typeface="Courier New" panose="02070309020205020404" pitchFamily="49" charset="0"/>
+                <a:cs typeface="Courier New" panose="02070309020205020404" pitchFamily="49" charset="0"/>
+              </a:rPr>
+              <a:t>etc</a:t>
+            </a:r>
+            <a:r>
+              <a:rPr lang="en-US" sz="2000" b="1" dirty="0">
+                <a:latin typeface="Courier New" panose="02070309020205020404" pitchFamily="49" charset="0"/>
+                <a:cs typeface="Courier New" panose="02070309020205020404" pitchFamily="49" charset="0"/>
+              </a:rPr>
+              <a:t>/</a:t>
+            </a:r>
+            <a:r>
+              <a:rPr lang="en-US" sz="2000" b="1" dirty="0" err="1">
+                <a:latin typeface="Courier New" panose="02070309020205020404" pitchFamily="49" charset="0"/>
+                <a:cs typeface="Courier New" panose="02070309020205020404" pitchFamily="49" charset="0"/>
+              </a:rPr>
+              <a:t>nginx</a:t>
+            </a:r>
+            <a:r>
+              <a:rPr lang="en-US" sz="2000" b="1" dirty="0">
+                <a:latin typeface="Courier New" panose="02070309020205020404" pitchFamily="49" charset="0"/>
+                <a:cs typeface="Courier New" panose="02070309020205020404" pitchFamily="49" charset="0"/>
+              </a:rPr>
+              <a:t>/</a:t>
+            </a:r>
+            <a:r>
+              <a:rPr lang="en-US" sz="2000" b="1" dirty="0" err="1">
+                <a:latin typeface="Courier New" panose="02070309020205020404" pitchFamily="49" charset="0"/>
+                <a:cs typeface="Courier New" panose="02070309020205020404" pitchFamily="49" charset="0"/>
+              </a:rPr>
+              <a:t>nginx.conf</a:t>
+            </a:r>
+            <a:r>
+              <a:rPr lang="en-US" sz="2000" b="1" dirty="0">
+                <a:latin typeface="Courier New" panose="02070309020205020404" pitchFamily="49" charset="0"/>
+                <a:cs typeface="Courier New" panose="02070309020205020404" pitchFamily="49" charset="0"/>
+              </a:rPr>
+              <a:t>':</a:t>
+            </a:r>
+            <a:endParaRPr sz="2000" b="1" dirty="0">
+              <a:latin typeface="Courier New" panose="02070309020205020404" pitchFamily="49" charset="0"/>
+              <a:cs typeface="Courier New" panose="02070309020205020404" pitchFamily="49" charset="0"/>
+            </a:endParaRPr>
+          </a:p>
+          <a:p>
+            <a:pPr>
+              <a:buSzPct val="45000"/>
+            </a:pPr>
+            <a:r>
+              <a:rPr lang="en-US" sz="2000" b="1" dirty="0">
+                <a:latin typeface="Courier New" panose="02070309020205020404" pitchFamily="49" charset="0"/>
+                <a:cs typeface="Courier New" panose="02070309020205020404" pitchFamily="49" charset="0"/>
+              </a:rPr>
+              <a:t>    source  =&gt; 'puppet:///modules/</a:t>
+            </a:r>
+            <a:r>
+              <a:rPr lang="en-US" sz="2000" b="1" dirty="0" err="1">
+                <a:latin typeface="Courier New" panose="02070309020205020404" pitchFamily="49" charset="0"/>
+                <a:cs typeface="Courier New" panose="02070309020205020404" pitchFamily="49" charset="0"/>
+              </a:rPr>
+              <a:t>nginx</a:t>
+            </a:r>
+            <a:r>
+              <a:rPr lang="en-US" sz="2000" b="1" dirty="0">
+                <a:latin typeface="Courier New" panose="02070309020205020404" pitchFamily="49" charset="0"/>
+                <a:cs typeface="Courier New" panose="02070309020205020404" pitchFamily="49" charset="0"/>
+              </a:rPr>
+              <a:t>/</a:t>
+            </a:r>
+            <a:r>
+              <a:rPr lang="en-US" sz="2000" b="1" dirty="0" err="1">
+                <a:latin typeface="Courier New" panose="02070309020205020404" pitchFamily="49" charset="0"/>
+                <a:cs typeface="Courier New" panose="02070309020205020404" pitchFamily="49" charset="0"/>
+              </a:rPr>
+              <a:t>nginx.conf</a:t>
+            </a:r>
+            <a:r>
+              <a:rPr lang="en-US" sz="2000" b="1" dirty="0">
+                <a:latin typeface="Courier New" panose="02070309020205020404" pitchFamily="49" charset="0"/>
+                <a:cs typeface="Courier New" panose="02070309020205020404" pitchFamily="49" charset="0"/>
+              </a:rPr>
+              <a:t>',</a:t>
+            </a:r>
+            <a:endParaRPr sz="2000" b="1" dirty="0">
+              <a:latin typeface="Courier New" panose="02070309020205020404" pitchFamily="49" charset="0"/>
+              <a:cs typeface="Courier New" panose="02070309020205020404" pitchFamily="49" charset="0"/>
+            </a:endParaRPr>
+          </a:p>
+          <a:p>
+            <a:pPr>
+              <a:buSzPct val="45000"/>
+            </a:pPr>
+            <a:r>
+              <a:rPr lang="en-US" sz="2000" b="1" dirty="0">
+                <a:latin typeface="Courier New" panose="02070309020205020404" pitchFamily="49" charset="0"/>
+                <a:cs typeface="Courier New" panose="02070309020205020404" pitchFamily="49" charset="0"/>
+              </a:rPr>
+              <a:t>    require =&gt; Package['</a:t>
+            </a:r>
+            <a:r>
+              <a:rPr lang="en-US" sz="2000" b="1" dirty="0" err="1">
+                <a:latin typeface="Courier New" panose="02070309020205020404" pitchFamily="49" charset="0"/>
+                <a:cs typeface="Courier New" panose="02070309020205020404" pitchFamily="49" charset="0"/>
+              </a:rPr>
+              <a:t>nginx</a:t>
+            </a:r>
+            <a:r>
+              <a:rPr lang="en-US" sz="2000" b="1" dirty="0">
+                <a:latin typeface="Courier New" panose="02070309020205020404" pitchFamily="49" charset="0"/>
+                <a:cs typeface="Courier New" panose="02070309020205020404" pitchFamily="49" charset="0"/>
+              </a:rPr>
+              <a:t>'],</a:t>
+            </a:r>
+            <a:endParaRPr sz="2000" b="1" dirty="0">
+              <a:latin typeface="Courier New" panose="02070309020205020404" pitchFamily="49" charset="0"/>
+              <a:cs typeface="Courier New" panose="02070309020205020404" pitchFamily="49" charset="0"/>
+            </a:endParaRPr>
+          </a:p>
+          <a:p>
+            <a:pPr>
+              <a:buSzPct val="45000"/>
+            </a:pPr>
+            <a:r>
+              <a:rPr lang="en-US" sz="2000" b="1" dirty="0">
+                <a:latin typeface="Courier New" panose="02070309020205020404" pitchFamily="49" charset="0"/>
+                <a:cs typeface="Courier New" panose="02070309020205020404" pitchFamily="49" charset="0"/>
+              </a:rPr>
+              <a:t>    notify  =&gt; Service['</a:t>
+            </a:r>
+            <a:r>
+              <a:rPr lang="en-US" sz="2000" b="1" dirty="0" err="1">
+                <a:latin typeface="Courier New" panose="02070309020205020404" pitchFamily="49" charset="0"/>
+                <a:cs typeface="Courier New" panose="02070309020205020404" pitchFamily="49" charset="0"/>
+              </a:rPr>
+              <a:t>nginx</a:t>
+            </a:r>
+            <a:r>
+              <a:rPr lang="en-US" sz="2000" b="1" dirty="0">
+                <a:latin typeface="Courier New" panose="02070309020205020404" pitchFamily="49" charset="0"/>
+                <a:cs typeface="Courier New" panose="02070309020205020404" pitchFamily="49" charset="0"/>
+              </a:rPr>
+              <a:t>'];</a:t>
+            </a:r>
+            <a:endParaRPr sz="2000" b="1" dirty="0">
+              <a:latin typeface="Courier New" panose="02070309020205020404" pitchFamily="49" charset="0"/>
+              <a:cs typeface="Courier New" panose="02070309020205020404" pitchFamily="49" charset="0"/>
+            </a:endParaRPr>
+          </a:p>
+          <a:p>
+            <a:pPr>
+              <a:buSzPct val="45000"/>
+            </a:pPr>
+            <a:r>
+              <a:rPr lang="en-US" sz="2000" b="1" dirty="0">
+                <a:latin typeface="Courier New" panose="02070309020205020404" pitchFamily="49" charset="0"/>
+                <a:cs typeface="Courier New" panose="02070309020205020404" pitchFamily="49" charset="0"/>
+              </a:rPr>
+              <a:t>  }</a:t>
+            </a:r>
+            <a:endParaRPr sz="2000" b="1" dirty="0">
+              <a:latin typeface="Courier New" panose="02070309020205020404" pitchFamily="49" charset="0"/>
+              <a:cs typeface="Courier New" panose="02070309020205020404" pitchFamily="49" charset="0"/>
+            </a:endParaRPr>
+          </a:p>
+          <a:p>
+            <a:pPr>
+              <a:buSzPct val="45000"/>
+            </a:pPr>
+            <a:r>
+              <a:rPr lang="en-US" sz="2000" b="1" dirty="0">
+                <a:latin typeface="Courier New" panose="02070309020205020404" pitchFamily="49" charset="0"/>
+                <a:cs typeface="Courier New" panose="02070309020205020404" pitchFamily="49" charset="0"/>
+              </a:rPr>
+              <a:t>}</a:t>
+            </a:r>
+            <a:endParaRPr sz="2000" b="1" dirty="0">
+              <a:latin typeface="Courier New" panose="02070309020205020404" pitchFamily="49" charset="0"/>
+              <a:cs typeface="Courier New" panose="02070309020205020404" pitchFamily="49" charset="0"/>
+            </a:endParaRPr>
+          </a:p>
+        </p:txBody>
+      </p:sp>
+      <p:pic>
+        <p:nvPicPr>
+          <p:cNvPr id="176" name="Picture 175"/>
+          <p:cNvPicPr/>
+          <p:nvPr/>
+        </p:nvPicPr>
+        <p:blipFill>
+          <a:blip r:embed="rId2"/>
+          <a:stretch>
+            <a:fillRect/>
+          </a:stretch>
+        </p:blipFill>
+        <p:spPr>
+          <a:xfrm>
+            <a:off x="8438238" y="1642685"/>
+            <a:ext cx="3657600" cy="3602880"/>
+          </a:xfrm>
+          <a:prstGeom prst="rect">
+            <a:avLst/>
+          </a:prstGeom>
+          <a:ln>
+            <a:noFill/>
+          </a:ln>
+        </p:spPr>
+      </p:pic>
+    </p:spTree>
+    <p:extLst>
+      <p:ext uri="{BB962C8B-B14F-4D97-AF65-F5344CB8AC3E}">
+        <p14:creationId xmlns:p14="http://schemas.microsoft.com/office/powerpoint/2010/main" val="2380265096"/>
+      </p:ext>
+    </p:extLst>
+  </p:cSld>
+  <p:clrMapOvr>
+    <a:masterClrMapping/>
+  </p:clrMapOvr>
+  <p:timing>
+    <p:tnLst>
+      <p:par>
+        <p:cTn id="1" dur="indefinite" restart="never" nodeType="tmRoot">
+          <p:childTnLst>
+            <p:seq>
+              <p:cTn id="2" nodeType="mainSeq"/>
+              <p:prevCondLst>
+                <p:cond evt="onPrev" delay="0">
+                  <p:tgtEl>
+                    <p:sldTgt/>
+                  </p:tgtEl>
+                </p:cond>
+              </p:prevCondLst>
+              <p:nextCondLst>
+                <p:cond evt="onNext" delay="0">
+                  <p:tgtEl>
+                    <p:sldTgt/>
+                  </p:tgtEl>
+                </p:cond>
+              </p:nextCondLst>
+            </p:seq>
+          </p:childTnLst>
+        </p:cTn>
+      </p:par>
+    </p:tnLst>
+  </p:timing>
+</p:sld>
+</file>
+
+<file path=ppt/slides/slide23.xml><?xml version="1.0" encoding="utf-8"?>
+<p:sld xmlns:a="http://schemas.openxmlformats.org/drawingml/2006/main" xmlns:r="http://schemas.openxmlformats.org/officeDocument/2006/relationships" xmlns:p="http://schemas.openxmlformats.org/presentationml/2006/main">
+  <p:cSld>
+    <p:spTree>
+      <p:nvGrpSpPr>
+        <p:cNvPr id="1" name=""/>
+        <p:cNvGrpSpPr/>
+        <p:nvPr/>
+      </p:nvGrpSpPr>
+      <p:grpSpPr>
+        <a:xfrm>
+          <a:off x="0" y="0"/>
+          <a:ext cx="0" cy="0"/>
+          <a:chOff x="0" y="0"/>
+          <a:chExt cx="0" cy="0"/>
+        </a:xfrm>
+      </p:grpSpPr>
+      <p:sp>
+        <p:nvSpPr>
           <p:cNvPr id="177" name="TextShape 1"/>
           <p:cNvSpPr txBox="1"/>
           <p:nvPr/>
@@ -6366,7 +7123,7 @@
 </p:sld>
 </file>
 
-<file path=ppt/slides/slide21.xml><?xml version="1.0" encoding="utf-8"?>
+<file path=ppt/slides/slide24.xml><?xml version="1.0" encoding="utf-8"?>
 <p:sld xmlns:a="http://schemas.openxmlformats.org/drawingml/2006/main" xmlns:r="http://schemas.openxmlformats.org/officeDocument/2006/relationships" xmlns:p="http://schemas.openxmlformats.org/presentationml/2006/main">
   <p:cSld>
     <p:spTree>
@@ -6548,7 +7305,7 @@
 </p:sld>
 </file>
 
-<file path=ppt/slides/slide22.xml><?xml version="1.0" encoding="utf-8"?>
+<file path=ppt/slides/slide25.xml><?xml version="1.0" encoding="utf-8"?>
 <p:sld xmlns:a="http://schemas.openxmlformats.org/drawingml/2006/main" xmlns:r="http://schemas.openxmlformats.org/officeDocument/2006/relationships" xmlns:p="http://schemas.openxmlformats.org/presentationml/2006/main">
   <p:cSld>
     <p:spTree>
@@ -6727,7 +7484,7 @@
 </p:sld>
 </file>
 
-<file path=ppt/slides/slide23.xml><?xml version="1.0" encoding="utf-8"?>
+<file path=ppt/slides/slide26.xml><?xml version="1.0" encoding="utf-8"?>
 <p:sld xmlns:a="http://schemas.openxmlformats.org/drawingml/2006/main" xmlns:r="http://schemas.openxmlformats.org/officeDocument/2006/relationships" xmlns:p="http://schemas.openxmlformats.org/presentationml/2006/main">
   <p:cSld>
     <p:spTree>
@@ -6926,15 +7683,7 @@
                   <a:srgbClr val="000000"/>
                 </a:solidFill>
               </a:rPr>
-              <a:t>Online Interactive </a:t>
-            </a:r>
-            <a:r>
-              <a:rPr lang="en-US" sz="2800" dirty="0">
-                <a:solidFill>
-                  <a:srgbClr val="000000"/>
-                </a:solidFill>
-              </a:rPr>
-              <a:t>White Boards</a:t>
+              <a:t>Online Interactive White Boards</a:t>
             </a:r>
           </a:p>
           <a:p>
@@ -6977,7 +7726,7 @@
                   <a:srgbClr val="000000"/>
                 </a:solidFill>
               </a:rPr>
-              <a:t>Document </a:t>
+              <a:t>Text-chat </a:t>
             </a:r>
             <a:r>
               <a:rPr lang="en-US" sz="2800" dirty="0">
@@ -6985,7 +7734,7 @@
                   <a:srgbClr val="000000"/>
                 </a:solidFill>
               </a:rPr>
-              <a:t>upload, text-chat and more.</a:t>
+              <a:t>and more.</a:t>
             </a:r>
           </a:p>
         </p:txBody>
@@ -7193,15 +7942,25 @@
           <a:p>
             <a:r>
               <a:rPr lang="en-US" dirty="0" smtClean="0"/>
-              <a:t>Geographical location and timing </a:t>
-            </a:r>
+              <a:t>Geographical location and </a:t>
+            </a:r>
+            <a:r>
+              <a:rPr lang="en-US" dirty="0" smtClean="0"/>
+              <a:t>timing</a:t>
+            </a:r>
+            <a:endParaRPr lang="en-US" dirty="0" smtClean="0"/>
           </a:p>
           <a:p>
             <a:pPr lvl="1"/>
             <a:r>
               <a:rPr lang="en-US" dirty="0" smtClean="0"/>
-              <a:t>Sharing knowledge and </a:t>
-            </a:r>
+              <a:t>Sharing </a:t>
+            </a:r>
+            <a:r>
+              <a:rPr lang="en-US" dirty="0" smtClean="0"/>
+              <a:t>knowledge</a:t>
+            </a:r>
+            <a:endParaRPr lang="en-US" dirty="0" smtClean="0"/>
           </a:p>
           <a:p>
             <a:pPr lvl="1"/>
@@ -7354,23 +8113,15 @@
               <a:rPr lang="en-US" dirty="0" smtClean="0"/>
               <a:t>collaboration</a:t>
             </a:r>
-            <a:endParaRPr lang="en-US" dirty="0"/>
-          </a:p>
-          <a:p>
+          </a:p>
+          <a:p>
+            <a:r>
+              <a:rPr lang="en-US" dirty="0" smtClean="0"/>
+              <a:t>Text </a:t>
+            </a:r>
             <a:r>
               <a:rPr lang="en-US" dirty="0"/>
-              <a:t>Image and document </a:t>
-            </a:r>
-            <a:r>
-              <a:rPr lang="en-US" dirty="0" smtClean="0"/>
-              <a:t>upload and sharing</a:t>
-            </a:r>
-            <a:endParaRPr lang="en-US" dirty="0"/>
-          </a:p>
-          <a:p>
-            <a:r>
-              <a:rPr lang="en-US" dirty="0"/>
-              <a:t>Text chat with </a:t>
+              <a:t>chat with </a:t>
             </a:r>
             <a:r>
               <a:rPr lang="en-US" dirty="0" smtClean="0"/>
@@ -7460,7 +8211,9 @@
         </p:nvSpPr>
         <p:spPr/>
         <p:txBody>
-          <a:bodyPr/>
+          <a:bodyPr>
+            <a:normAutofit/>
+          </a:bodyPr>
           <a:lstStyle/>
           <a:p>
             <a:r>
@@ -7474,8 +8227,22 @@
           </a:p>
           <a:p>
             <a:r>
+              <a:rPr lang="en-US" dirty="0"/>
+              <a:t>MySQL </a:t>
+            </a:r>
+            <a:r>
               <a:rPr lang="en-US" dirty="0" smtClean="0"/>
-              <a:t>Database (MySQL, Entity Framework)</a:t>
+              <a:t>database</a:t>
+            </a:r>
+          </a:p>
+          <a:p>
+            <a:r>
+              <a:rPr lang="en-US" dirty="0"/>
+              <a:t>Java REST </a:t>
+            </a:r>
+            <a:r>
+              <a:rPr lang="en-US" dirty="0" smtClean="0"/>
+              <a:t>API</a:t>
             </a:r>
           </a:p>
           <a:p>
@@ -7485,17 +8252,42 @@
             </a:r>
             <a:r>
               <a:rPr lang="en-US" dirty="0"/>
-              <a:t> </a:t>
+              <a:t> server and load </a:t>
             </a:r>
             <a:r>
               <a:rPr lang="en-US" dirty="0" smtClean="0"/>
-              <a:t>server</a:t>
-            </a:r>
-          </a:p>
-          <a:p>
+              <a:t>balancer</a:t>
+            </a:r>
+          </a:p>
+          <a:p>
+            <a:r>
+              <a:rPr lang="en-US" dirty="0" err="1"/>
+              <a:t>Nginx</a:t>
+            </a:r>
             <a:r>
               <a:rPr lang="en-US" dirty="0"/>
-              <a:t>JavaScript client </a:t>
+              <a:t> load </a:t>
+            </a:r>
+            <a:r>
+              <a:rPr lang="en-US" dirty="0" smtClean="0"/>
+              <a:t>balancer</a:t>
+            </a:r>
+          </a:p>
+          <a:p>
+            <a:r>
+              <a:rPr lang="en-US" dirty="0" err="1" smtClean="0"/>
+              <a:t>Redis</a:t>
+            </a:r>
+            <a:endParaRPr lang="en-US" dirty="0" smtClean="0"/>
+          </a:p>
+          <a:p>
+            <a:r>
+              <a:rPr lang="en-US" dirty="0" smtClean="0"/>
+              <a:t>JavaScript </a:t>
+            </a:r>
+            <a:r>
+              <a:rPr lang="en-US" dirty="0"/>
+              <a:t>client </a:t>
             </a:r>
             <a:r>
               <a:rPr lang="en-US" dirty="0" smtClean="0"/>
@@ -7504,18 +8296,8 @@
           </a:p>
           <a:p>
             <a:r>
-              <a:rPr lang="en-US" dirty="0"/>
-              <a:t>Java </a:t>
-            </a:r>
-            <a:r>
-              <a:rPr lang="en-US" dirty="0" smtClean="0"/>
-              <a:t>REST API</a:t>
-            </a:r>
-          </a:p>
-          <a:p>
-            <a:r>
-              <a:rPr lang="en-US" dirty="0" smtClean="0"/>
-              <a:t>Socket.io</a:t>
+              <a:rPr lang="en-US" dirty="0" err="1" smtClean="0"/>
+              <a:t>SocketIO</a:t>
             </a:r>
             <a:endParaRPr lang="en-US" dirty="0"/>
           </a:p>
@@ -7876,90 +8658,90 @@
           <a:p>
             <a:pPr algn="ctr"/>
             <a:r>
-              <a:rPr lang="en-US" sz="2400">
+              <a:rPr lang="en-US" sz="2400" dirty="0">
                 <a:latin typeface="Arial"/>
               </a:rPr>
               <a:t>Out client side implementation utilizes</a:t>
             </a:r>
-            <a:endParaRPr/>
+            <a:endParaRPr dirty="0"/>
           </a:p>
           <a:p>
             <a:pPr algn="ctr"/>
             <a:r>
-              <a:rPr lang="en-US" sz="2400">
+              <a:rPr lang="en-US" sz="2400" dirty="0">
                 <a:latin typeface="Arial"/>
               </a:rPr>
               <a:t>some of the latest web technologies.</a:t>
             </a:r>
-            <a:endParaRPr/>
+            <a:endParaRPr dirty="0"/>
           </a:p>
           <a:p>
             <a:pPr algn="ctr"/>
-            <a:endParaRPr/>
+            <a:endParaRPr dirty="0"/>
           </a:p>
           <a:p>
             <a:pPr algn="ctr"/>
             <a:r>
-              <a:rPr lang="en-US" sz="2400">
+              <a:rPr lang="en-US" sz="2400" dirty="0">
                 <a:latin typeface="Arial"/>
               </a:rPr>
               <a:t>HTML5, CSS3, and the latest JavaScript methods allow for</a:t>
             </a:r>
-            <a:endParaRPr/>
+            <a:endParaRPr dirty="0"/>
           </a:p>
           <a:p>
             <a:pPr algn="ctr"/>
             <a:r>
-              <a:rPr lang="en-US" sz="2400">
+              <a:rPr lang="en-US" sz="2400" dirty="0">
                 <a:latin typeface="Arial"/>
               </a:rPr>
               <a:t>much greater flexibility in what can be done within a browser.</a:t>
             </a:r>
-            <a:endParaRPr/>
+            <a:endParaRPr dirty="0"/>
           </a:p>
           <a:p>
             <a:pPr algn="ctr"/>
             <a:r>
-              <a:rPr lang="en-US" sz="2400">
+              <a:rPr lang="en-US" sz="2400" dirty="0">
                 <a:latin typeface="Arial"/>
               </a:rPr>
               <a:t>With canvas and SVG this includes image manipulation.</a:t>
             </a:r>
-            <a:endParaRPr/>
+            <a:endParaRPr dirty="0"/>
           </a:p>
           <a:p>
             <a:pPr algn="ctr"/>
             <a:r>
-              <a:rPr lang="en-US" sz="2400">
+              <a:rPr lang="en-US" sz="2400" dirty="0">
                 <a:latin typeface="Arial"/>
               </a:rPr>
               <a:t>The w3c is planning increased future integration of between them.</a:t>
             </a:r>
-            <a:endParaRPr/>
+            <a:endParaRPr dirty="0"/>
           </a:p>
           <a:p>
             <a:pPr algn="ctr"/>
-            <a:endParaRPr/>
+            <a:endParaRPr dirty="0"/>
           </a:p>
           <a:p>
             <a:pPr algn="ctr"/>
             <a:r>
-              <a:rPr lang="en-US" sz="2400">
+              <a:rPr lang="en-US" sz="2400" dirty="0">
                 <a:latin typeface="Arial"/>
               </a:rPr>
               <a:t>We use web sockets for real time interaction</a:t>
             </a:r>
-            <a:endParaRPr/>
+            <a:endParaRPr dirty="0"/>
           </a:p>
           <a:p>
             <a:pPr algn="ctr"/>
             <a:r>
-              <a:rPr lang="en-US" sz="2400">
+              <a:rPr lang="en-US" sz="2400" dirty="0">
                 <a:latin typeface="Arial"/>
               </a:rPr>
               <a:t>and AJAX style calls for database interactions.</a:t>
             </a:r>
-            <a:endParaRPr/>
+            <a:endParaRPr dirty="0"/>
           </a:p>
         </p:txBody>
       </p:sp>
@@ -8104,8 +8886,8 @@
         </p:nvSpPr>
         <p:spPr>
           <a:xfrm>
-            <a:off x="182880" y="2103120"/>
-            <a:ext cx="11887200" cy="3931920"/>
+            <a:off x="182880" y="2034862"/>
+            <a:ext cx="11887200" cy="4121239"/>
           </a:xfrm>
           <a:prstGeom prst="rect">
             <a:avLst/>
@@ -8124,8 +8906,14 @@
           <a:lstStyle/>
           <a:p>
             <a:pPr algn="ctr"/>
-            <a:r>
-              <a:rPr lang="en-US" sz="2000" b="1" dirty="0">
+            <a:endParaRPr lang="en-US" sz="2000" b="1" dirty="0" smtClean="0">
+              <a:latin typeface="Arial"/>
+            </a:endParaRPr>
+          </a:p>
+          <a:p>
+            <a:pPr algn="ctr"/>
+            <a:r>
+              <a:rPr lang="en-US" sz="2000" b="1" dirty="0" smtClean="0">
                 <a:latin typeface="Arial"/>
               </a:rPr>
               <a:t>jQuery</a:t>
@@ -8144,18 +8932,18 @@
           </a:p>
           <a:p>
             <a:pPr algn="ctr"/>
-            <a:endParaRPr dirty="0"/>
+            <a:endParaRPr dirty="0" smtClean="0"/>
           </a:p>
           <a:p>
             <a:pPr algn="ctr"/>
             <a:r>
-              <a:rPr lang="en-US" sz="2000" b="1" dirty="0">
+              <a:rPr lang="en-US" sz="2000" b="1" dirty="0" smtClean="0">
                 <a:latin typeface="Arial"/>
               </a:rPr>
               <a:t>jQuery-</a:t>
             </a:r>
             <a:r>
-              <a:rPr lang="en-US" sz="2000" b="1" dirty="0" err="1">
+              <a:rPr lang="en-US" sz="2000" b="1" dirty="0" err="1" smtClean="0">
                 <a:latin typeface="Arial"/>
               </a:rPr>
               <a:t>ui</a:t>

</xml_diff>